<commit_message>
Updated presentation with latest config parms and output format
Signed-off-by: Andreas Maier <maiera@de.ibm.com>
</commit_message>
<xml_diff>
--- a/IBM_Z_HMC_Log_Forwarder.pptx
+++ b/IBM_Z_HMC_Log_Forwarder.pptx
@@ -3023,7 +3023,7 @@
             </a:pPr>
             <a:r>
               <a:rPr lang="en-US" spc="-1" dirty="0"/>
-              <a:t>Available as </a:t>
+              <a:t>Future: Available as </a:t>
             </a:r>
             <a:r>
               <a:rPr lang="en-US" sz="2000" spc="-1" dirty="0"/>
@@ -4381,8 +4381,8 @@
         </p:nvSpPr>
         <p:spPr>
           <a:xfrm>
-            <a:off x="457200" y="1043801"/>
-            <a:ext cx="8329749" cy="4355514"/>
+            <a:off x="457200" y="930442"/>
+            <a:ext cx="8329749" cy="4468873"/>
           </a:xfrm>
         </p:spPr>
         <p:txBody>
@@ -4428,11 +4428,6 @@
                 <a:latin typeface="Courier" pitchFamily="2" charset="0"/>
               </a:rPr>
             </a:br>
-            <a:br>
-              <a:rPr lang="de-DE" sz="1100" dirty="0">
-                <a:latin typeface="Courier" pitchFamily="2" charset="0"/>
-              </a:rPr>
-            </a:br>
             <a:r>
               <a:rPr lang="de-DE" sz="1100" dirty="0">
                 <a:latin typeface="Courier" pitchFamily="2" charset="0"/>
@@ -4467,7 +4462,248 @@
               <a:rPr lang="de-DE" sz="1100" dirty="0" err="1">
                 <a:latin typeface="Courier" pitchFamily="2" charset="0"/>
               </a:rPr>
-              <a:t>talk</a:t>
+              <a:t>collect</a:t>
+            </a:r>
+            <a:r>
+              <a:rPr lang="de-DE" sz="1100" dirty="0">
+                <a:latin typeface="Courier" pitchFamily="2" charset="0"/>
+              </a:rPr>
+              <a:t> </a:t>
+            </a:r>
+            <a:r>
+              <a:rPr lang="de-DE" sz="1100" dirty="0" err="1">
+                <a:latin typeface="Courier" pitchFamily="2" charset="0"/>
+              </a:rPr>
+              <a:t>the</a:t>
+            </a:r>
+            <a:r>
+              <a:rPr lang="de-DE" sz="1100" dirty="0">
+                <a:latin typeface="Courier" pitchFamily="2" charset="0"/>
+              </a:rPr>
+              <a:t> log </a:t>
+            </a:r>
+            <a:r>
+              <a:rPr lang="de-DE" sz="1100" dirty="0" err="1">
+                <a:latin typeface="Courier" pitchFamily="2" charset="0"/>
+              </a:rPr>
+              <a:t>entries</a:t>
+            </a:r>
+            <a:r>
+              <a:rPr lang="de-DE" sz="1100" dirty="0">
+                <a:latin typeface="Courier" pitchFamily="2" charset="0"/>
+              </a:rPr>
+              <a:t> </a:t>
+            </a:r>
+            <a:r>
+              <a:rPr lang="de-DE" sz="1100" dirty="0" err="1">
+                <a:latin typeface="Courier" pitchFamily="2" charset="0"/>
+              </a:rPr>
+              <a:t>from</a:t>
+            </a:r>
+            <a:r>
+              <a:rPr lang="de-DE" sz="1100" dirty="0">
+                <a:latin typeface="Courier" pitchFamily="2" charset="0"/>
+              </a:rPr>
+              <a:t>:</a:t>
+            </a:r>
+            <a:br>
+              <a:rPr lang="de-DE" sz="1100" dirty="0">
+                <a:latin typeface="Courier" pitchFamily="2" charset="0"/>
+              </a:rPr>
+            </a:br>
+            <a:br>
+              <a:rPr lang="de-DE" sz="1100" dirty="0">
+                <a:latin typeface="Courier" pitchFamily="2" charset="0"/>
+              </a:rPr>
+            </a:br>
+            <a:r>
+              <a:rPr lang="de-DE" sz="1100" dirty="0" err="1">
+                <a:latin typeface="Courier" pitchFamily="2" charset="0"/>
+              </a:rPr>
+              <a:t>hmc_host</a:t>
+            </a:r>
+            <a:r>
+              <a:rPr lang="de-DE" sz="1100" dirty="0">
+                <a:latin typeface="Courier" pitchFamily="2" charset="0"/>
+              </a:rPr>
+              <a:t>: 10.11.12.13.     # IP </a:t>
+            </a:r>
+            <a:r>
+              <a:rPr lang="de-DE" sz="1100" dirty="0" err="1">
+                <a:latin typeface="Courier" pitchFamily="2" charset="0"/>
+              </a:rPr>
+              <a:t>address</a:t>
+            </a:r>
+            <a:r>
+              <a:rPr lang="de-DE" sz="1100" dirty="0">
+                <a:latin typeface="Courier" pitchFamily="2" charset="0"/>
+              </a:rPr>
+              <a:t> </a:t>
+            </a:r>
+            <a:r>
+              <a:rPr lang="de-DE" sz="1100" dirty="0" err="1">
+                <a:latin typeface="Courier" pitchFamily="2" charset="0"/>
+              </a:rPr>
+              <a:t>or</a:t>
+            </a:r>
+            <a:r>
+              <a:rPr lang="de-DE" sz="1100" dirty="0">
+                <a:latin typeface="Courier" pitchFamily="2" charset="0"/>
+              </a:rPr>
+              <a:t> </a:t>
+            </a:r>
+            <a:r>
+              <a:rPr lang="de-DE" sz="1100" dirty="0" err="1">
+                <a:latin typeface="Courier" pitchFamily="2" charset="0"/>
+              </a:rPr>
+              <a:t>hostname</a:t>
+            </a:r>
+            <a:r>
+              <a:rPr lang="de-DE" sz="1100" dirty="0">
+                <a:latin typeface="Courier" pitchFamily="2" charset="0"/>
+              </a:rPr>
+              <a:t> </a:t>
+            </a:r>
+            <a:r>
+              <a:rPr lang="de-DE" sz="1100" dirty="0" err="1">
+                <a:latin typeface="Courier" pitchFamily="2" charset="0"/>
+              </a:rPr>
+              <a:t>of</a:t>
+            </a:r>
+            <a:r>
+              <a:rPr lang="de-DE" sz="1100" dirty="0">
+                <a:latin typeface="Courier" pitchFamily="2" charset="0"/>
+              </a:rPr>
+              <a:t> </a:t>
+            </a:r>
+            <a:r>
+              <a:rPr lang="de-DE" sz="1100" dirty="0" err="1">
+                <a:latin typeface="Courier" pitchFamily="2" charset="0"/>
+              </a:rPr>
+              <a:t>the</a:t>
+            </a:r>
+            <a:r>
+              <a:rPr lang="de-DE" sz="1100" dirty="0">
+                <a:latin typeface="Courier" pitchFamily="2" charset="0"/>
+              </a:rPr>
+              <a:t> HMC</a:t>
+            </a:r>
+            <a:br>
+              <a:rPr lang="de-DE" sz="1100" dirty="0">
+                <a:latin typeface="Courier" pitchFamily="2" charset="0"/>
+              </a:rPr>
+            </a:br>
+            <a:r>
+              <a:rPr lang="de-DE" sz="1100" dirty="0" err="1">
+                <a:latin typeface="Courier" pitchFamily="2" charset="0"/>
+              </a:rPr>
+              <a:t>hmc_user</a:t>
+            </a:r>
+            <a:r>
+              <a:rPr lang="de-DE" sz="1100" dirty="0">
+                <a:latin typeface="Courier" pitchFamily="2" charset="0"/>
+              </a:rPr>
+              <a:t>: </a:t>
+            </a:r>
+            <a:r>
+              <a:rPr lang="de-DE" sz="1100" dirty="0" err="1">
+                <a:latin typeface="Courier" pitchFamily="2" charset="0"/>
+              </a:rPr>
+              <a:t>myuser</a:t>
+            </a:r>
+            <a:r>
+              <a:rPr lang="de-DE" sz="1100" dirty="0">
+                <a:latin typeface="Courier" pitchFamily="2" charset="0"/>
+              </a:rPr>
+              <a:t>           # HMC </a:t>
+            </a:r>
+            <a:r>
+              <a:rPr lang="de-DE" sz="1100" dirty="0" err="1">
+                <a:latin typeface="Courier" pitchFamily="2" charset="0"/>
+              </a:rPr>
+              <a:t>userid</a:t>
+            </a:r>
+            <a:br>
+              <a:rPr lang="de-DE" sz="1100" dirty="0">
+                <a:latin typeface="Courier" pitchFamily="2" charset="0"/>
+              </a:rPr>
+            </a:br>
+            <a:r>
+              <a:rPr lang="de-DE" sz="1100" dirty="0" err="1">
+                <a:latin typeface="Courier" pitchFamily="2" charset="0"/>
+              </a:rPr>
+              <a:t>hmc_password</a:t>
+            </a:r>
+            <a:r>
+              <a:rPr lang="de-DE" sz="1100" dirty="0">
+                <a:latin typeface="Courier" pitchFamily="2" charset="0"/>
+              </a:rPr>
+              <a:t>: </a:t>
+            </a:r>
+            <a:r>
+              <a:rPr lang="de-DE" sz="1100" dirty="0" err="1">
+                <a:latin typeface="Courier" pitchFamily="2" charset="0"/>
+              </a:rPr>
+              <a:t>mypassword</a:t>
+            </a:r>
+            <a:r>
+              <a:rPr lang="de-DE" sz="1100" dirty="0">
+                <a:latin typeface="Courier" pitchFamily="2" charset="0"/>
+              </a:rPr>
+              <a:t>   # HMC </a:t>
+            </a:r>
+            <a:r>
+              <a:rPr lang="de-DE" sz="1100" dirty="0" err="1">
+                <a:latin typeface="Courier" pitchFamily="2" charset="0"/>
+              </a:rPr>
+              <a:t>password</a:t>
+            </a:r>
+            <a:br>
+              <a:rPr lang="de-DE" sz="1100" dirty="0">
+                <a:latin typeface="Courier" pitchFamily="2" charset="0"/>
+              </a:rPr>
+            </a:br>
+            <a:r>
+              <a:rPr lang="de-DE" sz="1100" dirty="0" err="1">
+                <a:latin typeface="Courier" pitchFamily="2" charset="0"/>
+              </a:rPr>
+              <a:t>label</a:t>
+            </a:r>
+            <a:r>
+              <a:rPr lang="de-DE" sz="1100" dirty="0">
+                <a:latin typeface="Courier" pitchFamily="2" charset="0"/>
+              </a:rPr>
+              <a:t>: region1-zone2-hmc1  # Label </a:t>
+            </a:r>
+            <a:r>
+              <a:rPr lang="de-DE" sz="1100" dirty="0" err="1">
+                <a:latin typeface="Courier" pitchFamily="2" charset="0"/>
+              </a:rPr>
+              <a:t>for</a:t>
+            </a:r>
+            <a:r>
+              <a:rPr lang="de-DE" sz="1100" dirty="0">
+                <a:latin typeface="Courier" pitchFamily="2" charset="0"/>
+              </a:rPr>
+              <a:t> </a:t>
+            </a:r>
+            <a:r>
+              <a:rPr lang="de-DE" sz="1100" dirty="0" err="1">
+                <a:latin typeface="Courier" pitchFamily="2" charset="0"/>
+              </a:rPr>
+              <a:t>use</a:t>
+            </a:r>
+            <a:r>
+              <a:rPr lang="de-DE" sz="1100" dirty="0">
+                <a:latin typeface="Courier" pitchFamily="2" charset="0"/>
+              </a:rPr>
+              <a:t> in log </a:t>
+            </a:r>
+            <a:r>
+              <a:rPr lang="de-DE" sz="1100" dirty="0" err="1">
+                <a:latin typeface="Courier" pitchFamily="2" charset="0"/>
+              </a:rPr>
+              <a:t>output</a:t>
             </a:r>
             <a:r>
               <a:rPr lang="de-DE" sz="1100" dirty="0">
@@ -4485,6 +4721,100 @@
               <a:rPr lang="de-DE" sz="1100" dirty="0">
                 <a:latin typeface="Courier" pitchFamily="2" charset="0"/>
               </a:rPr>
+              <a:t> </a:t>
+            </a:r>
+            <a:r>
+              <a:rPr lang="de-DE" sz="1100" dirty="0" err="1">
+                <a:latin typeface="Courier" pitchFamily="2" charset="0"/>
+              </a:rPr>
+              <a:t>identify</a:t>
+            </a:r>
+            <a:r>
+              <a:rPr lang="de-DE" sz="1100" dirty="0">
+                <a:latin typeface="Courier" pitchFamily="2" charset="0"/>
+              </a:rPr>
+              <a:t> </a:t>
+            </a:r>
+            <a:r>
+              <a:rPr lang="de-DE" sz="1100" dirty="0" err="1">
+                <a:latin typeface="Courier" pitchFamily="2" charset="0"/>
+              </a:rPr>
+              <a:t>the</a:t>
+            </a:r>
+            <a:r>
+              <a:rPr lang="de-DE" sz="1100" dirty="0">
+                <a:latin typeface="Courier" pitchFamily="2" charset="0"/>
+              </a:rPr>
+              <a:t> </a:t>
+            </a:r>
+            <a:r>
+              <a:rPr lang="de-DE" sz="1100" dirty="0" err="1">
+                <a:latin typeface="Courier" pitchFamily="2" charset="0"/>
+              </a:rPr>
+              <a:t>source</a:t>
+            </a:r>
+            <a:br>
+              <a:rPr lang="de-DE" sz="1100" dirty="0">
+                <a:latin typeface="Courier" pitchFamily="2" charset="0"/>
+              </a:rPr>
+            </a:br>
+            <a:br>
+              <a:rPr lang="de-DE" sz="1100" dirty="0">
+                <a:latin typeface="Courier" pitchFamily="2" charset="0"/>
+              </a:rPr>
+            </a:br>
+            <a:r>
+              <a:rPr lang="de-DE" sz="1100" dirty="0">
+                <a:latin typeface="Courier" pitchFamily="2" charset="0"/>
+              </a:rPr>
+              <a:t># </a:t>
+            </a:r>
+            <a:r>
+              <a:rPr lang="de-DE" sz="1100" dirty="0" err="1">
+                <a:latin typeface="Courier" pitchFamily="2" charset="0"/>
+              </a:rPr>
+              <a:t>Which</a:t>
+            </a:r>
+            <a:r>
+              <a:rPr lang="de-DE" sz="1100" dirty="0">
+                <a:latin typeface="Courier" pitchFamily="2" charset="0"/>
+              </a:rPr>
+              <a:t> log </a:t>
+            </a:r>
+            <a:r>
+              <a:rPr lang="de-DE" sz="1100" dirty="0" err="1">
+                <a:latin typeface="Courier" pitchFamily="2" charset="0"/>
+              </a:rPr>
+              <a:t>entries</a:t>
+            </a:r>
+            <a:r>
+              <a:rPr lang="de-DE" sz="1100" dirty="0">
+                <a:latin typeface="Courier" pitchFamily="2" charset="0"/>
+              </a:rPr>
+              <a:t> </a:t>
+            </a:r>
+            <a:r>
+              <a:rPr lang="de-DE" sz="1100" dirty="0" err="1">
+                <a:latin typeface="Courier" pitchFamily="2" charset="0"/>
+              </a:rPr>
+              <a:t>to</a:t>
+            </a:r>
+            <a:r>
+              <a:rPr lang="de-DE" sz="1100" dirty="0">
+                <a:latin typeface="Courier" pitchFamily="2" charset="0"/>
+              </a:rPr>
+              <a:t> </a:t>
+            </a:r>
+            <a:r>
+              <a:rPr lang="de-DE" sz="1100" dirty="0" err="1">
+                <a:latin typeface="Courier" pitchFamily="2" charset="0"/>
+              </a:rPr>
+              <a:t>collect</a:t>
+            </a:r>
+            <a:r>
+              <a:rPr lang="de-DE" sz="1100" dirty="0">
+                <a:latin typeface="Courier" pitchFamily="2" charset="0"/>
+              </a:rPr>
               <a:t>:</a:t>
             </a:r>
             <a:br>
@@ -4501,13 +4831,462 @@
               <a:rPr lang="de-DE" sz="1100" dirty="0" err="1">
                 <a:latin typeface="Courier" pitchFamily="2" charset="0"/>
               </a:rPr>
-              <a:t>hmc_host</a:t>
-            </a:r>
-            <a:r>
-              <a:rPr lang="de-DE" sz="1100" dirty="0">
-                <a:latin typeface="Courier" pitchFamily="2" charset="0"/>
-              </a:rPr>
-              <a:t>: 10.11.12.13.     # IP </a:t>
+              <a:t>logs</a:t>
+            </a:r>
+            <a:r>
+              <a:rPr lang="de-DE" sz="1100" dirty="0">
+                <a:latin typeface="Courier" pitchFamily="2" charset="0"/>
+              </a:rPr>
+              <a:t>: [</a:t>
+            </a:r>
+            <a:r>
+              <a:rPr lang="de-DE" sz="1100" dirty="0" err="1">
+                <a:latin typeface="Courier" pitchFamily="2" charset="0"/>
+              </a:rPr>
+              <a:t>security</a:t>
+            </a:r>
+            <a:r>
+              <a:rPr lang="de-DE" sz="1100" dirty="0">
+                <a:latin typeface="Courier" pitchFamily="2" charset="0"/>
+              </a:rPr>
+              <a:t>, </a:t>
+            </a:r>
+            <a:r>
+              <a:rPr lang="de-DE" sz="1100" dirty="0" err="1">
+                <a:latin typeface="Courier" pitchFamily="2" charset="0"/>
+              </a:rPr>
+              <a:t>audit</a:t>
+            </a:r>
+            <a:r>
+              <a:rPr lang="de-DE" sz="1100" dirty="0">
+                <a:latin typeface="Courier" pitchFamily="2" charset="0"/>
+              </a:rPr>
+              <a:t>]    # List </a:t>
+            </a:r>
+            <a:r>
+              <a:rPr lang="de-DE" sz="1100" dirty="0" err="1">
+                <a:latin typeface="Courier" pitchFamily="2" charset="0"/>
+              </a:rPr>
+              <a:t>of</a:t>
+            </a:r>
+            <a:r>
+              <a:rPr lang="de-DE" sz="1100" dirty="0">
+                <a:latin typeface="Courier" pitchFamily="2" charset="0"/>
+              </a:rPr>
+              <a:t> log </a:t>
+            </a:r>
+            <a:r>
+              <a:rPr lang="de-DE" sz="1100" dirty="0" err="1">
+                <a:latin typeface="Courier" pitchFamily="2" charset="0"/>
+              </a:rPr>
+              <a:t>types</a:t>
+            </a:r>
+            <a:r>
+              <a:rPr lang="de-DE" sz="1100" dirty="0">
+                <a:latin typeface="Courier" pitchFamily="2" charset="0"/>
+              </a:rPr>
+              <a:t> </a:t>
+            </a:r>
+            <a:r>
+              <a:rPr lang="de-DE" sz="1100" dirty="0" err="1">
+                <a:latin typeface="Courier" pitchFamily="2" charset="0"/>
+              </a:rPr>
+              <a:t>to</a:t>
+            </a:r>
+            <a:r>
+              <a:rPr lang="de-DE" sz="1100" dirty="0">
+                <a:latin typeface="Courier" pitchFamily="2" charset="0"/>
+              </a:rPr>
+              <a:t> </a:t>
+            </a:r>
+            <a:r>
+              <a:rPr lang="de-DE" sz="1100" dirty="0" err="1">
+                <a:latin typeface="Courier" pitchFamily="2" charset="0"/>
+              </a:rPr>
+              <a:t>include</a:t>
+            </a:r>
+            <a:br>
+              <a:rPr lang="de-DE" sz="1100" dirty="0">
+                <a:latin typeface="Courier" pitchFamily="2" charset="0"/>
+              </a:rPr>
+            </a:br>
+            <a:r>
+              <a:rPr lang="de-DE" sz="1100" dirty="0" err="1">
+                <a:latin typeface="Courier" pitchFamily="2" charset="0"/>
+              </a:rPr>
+              <a:t>since</a:t>
+            </a:r>
+            <a:r>
+              <a:rPr lang="de-DE" sz="1100" dirty="0">
+                <a:latin typeface="Courier" pitchFamily="2" charset="0"/>
+              </a:rPr>
+              <a:t>: </a:t>
+            </a:r>
+            <a:r>
+              <a:rPr lang="de-DE" sz="1100" dirty="0" err="1">
+                <a:latin typeface="Courier" pitchFamily="2" charset="0"/>
+              </a:rPr>
+              <a:t>now</a:t>
+            </a:r>
+            <a:r>
+              <a:rPr lang="de-DE" sz="1100" dirty="0">
+                <a:latin typeface="Courier" pitchFamily="2" charset="0"/>
+              </a:rPr>
+              <a:t>                 # </a:t>
+            </a:r>
+            <a:r>
+              <a:rPr lang="de-DE" sz="1100" dirty="0" err="1">
+                <a:latin typeface="Courier" pitchFamily="2" charset="0"/>
+              </a:rPr>
+              <a:t>Include</a:t>
+            </a:r>
+            <a:r>
+              <a:rPr lang="de-DE" sz="1100" dirty="0">
+                <a:latin typeface="Courier" pitchFamily="2" charset="0"/>
+              </a:rPr>
+              <a:t> </a:t>
+            </a:r>
+            <a:r>
+              <a:rPr lang="de-DE" sz="1100" dirty="0" err="1">
+                <a:latin typeface="Courier" pitchFamily="2" charset="0"/>
+              </a:rPr>
+              <a:t>past</a:t>
+            </a:r>
+            <a:r>
+              <a:rPr lang="de-DE" sz="1100" dirty="0">
+                <a:latin typeface="Courier" pitchFamily="2" charset="0"/>
+              </a:rPr>
+              <a:t> log </a:t>
+            </a:r>
+            <a:r>
+              <a:rPr lang="de-DE" sz="1100" dirty="0" err="1">
+                <a:latin typeface="Courier" pitchFamily="2" charset="0"/>
+              </a:rPr>
+              <a:t>entries</a:t>
+            </a:r>
+            <a:r>
+              <a:rPr lang="de-DE" sz="1100" dirty="0">
+                <a:latin typeface="Courier" pitchFamily="2" charset="0"/>
+              </a:rPr>
+              <a:t> </a:t>
+            </a:r>
+            <a:r>
+              <a:rPr lang="de-DE" sz="1100" dirty="0" err="1">
+                <a:latin typeface="Courier" pitchFamily="2" charset="0"/>
+              </a:rPr>
+              <a:t>since</a:t>
+            </a:r>
+            <a:r>
+              <a:rPr lang="de-DE" sz="1100" dirty="0">
+                <a:latin typeface="Courier" pitchFamily="2" charset="0"/>
+              </a:rPr>
+              <a:t> </a:t>
+            </a:r>
+            <a:r>
+              <a:rPr lang="de-DE" sz="1100" dirty="0" err="1">
+                <a:latin typeface="Courier" pitchFamily="2" charset="0"/>
+              </a:rPr>
+              <a:t>when</a:t>
+            </a:r>
+            <a:r>
+              <a:rPr lang="de-DE" sz="1100" dirty="0">
+                <a:latin typeface="Courier" pitchFamily="2" charset="0"/>
+              </a:rPr>
+              <a:t>: all, </a:t>
+            </a:r>
+            <a:r>
+              <a:rPr lang="de-DE" sz="1100" dirty="0" err="1">
+                <a:latin typeface="Courier" pitchFamily="2" charset="0"/>
+              </a:rPr>
+              <a:t>now</a:t>
+            </a:r>
+            <a:r>
+              <a:rPr lang="de-DE" sz="1100" dirty="0">
+                <a:latin typeface="Courier" pitchFamily="2" charset="0"/>
+              </a:rPr>
+              <a:t>, </a:t>
+            </a:r>
+            <a:r>
+              <a:rPr lang="de-DE" sz="1100" dirty="0" err="1">
+                <a:latin typeface="Courier" pitchFamily="2" charset="0"/>
+              </a:rPr>
+              <a:t>date&amp;time</a:t>
+            </a:r>
+            <a:r>
+              <a:rPr lang="de-DE" sz="1100" dirty="0">
+                <a:latin typeface="Courier" pitchFamily="2" charset="0"/>
+              </a:rPr>
+              <a:t> </a:t>
+            </a:r>
+            <a:r>
+              <a:rPr lang="de-DE" sz="1100" dirty="0" err="1">
+                <a:latin typeface="Courier" pitchFamily="2" charset="0"/>
+              </a:rPr>
+              <a:t>string</a:t>
+            </a:r>
+            <a:br>
+              <a:rPr lang="de-DE" sz="1100" dirty="0">
+                <a:latin typeface="Courier" pitchFamily="2" charset="0"/>
+              </a:rPr>
+            </a:br>
+            <a:r>
+              <a:rPr lang="de-DE" sz="1100" dirty="0" err="1">
+                <a:latin typeface="Courier" pitchFamily="2" charset="0"/>
+              </a:rPr>
+              <a:t>future</a:t>
+            </a:r>
+            <a:r>
+              <a:rPr lang="de-DE" sz="1100" dirty="0">
+                <a:latin typeface="Courier" pitchFamily="2" charset="0"/>
+              </a:rPr>
+              <a:t>: </a:t>
+            </a:r>
+            <a:r>
+              <a:rPr lang="de-DE" sz="1100" dirty="0" err="1">
+                <a:latin typeface="Courier" pitchFamily="2" charset="0"/>
+              </a:rPr>
+              <a:t>true</a:t>
+            </a:r>
+            <a:r>
+              <a:rPr lang="de-DE" sz="1100" dirty="0">
+                <a:latin typeface="Courier" pitchFamily="2" charset="0"/>
+              </a:rPr>
+              <a:t>               # </a:t>
+            </a:r>
+            <a:r>
+              <a:rPr lang="de-DE" sz="1100" dirty="0" err="1">
+                <a:latin typeface="Courier" pitchFamily="2" charset="0"/>
+              </a:rPr>
+              <a:t>Wait</a:t>
+            </a:r>
+            <a:r>
+              <a:rPr lang="de-DE" sz="1100" dirty="0">
+                <a:latin typeface="Courier" pitchFamily="2" charset="0"/>
+              </a:rPr>
+              <a:t> </a:t>
+            </a:r>
+            <a:r>
+              <a:rPr lang="de-DE" sz="1100" dirty="0" err="1">
+                <a:latin typeface="Courier" pitchFamily="2" charset="0"/>
+              </a:rPr>
+              <a:t>for</a:t>
+            </a:r>
+            <a:r>
+              <a:rPr lang="de-DE" sz="1100" dirty="0">
+                <a:latin typeface="Courier" pitchFamily="2" charset="0"/>
+              </a:rPr>
+              <a:t> </a:t>
+            </a:r>
+            <a:r>
+              <a:rPr lang="de-DE" sz="1100" dirty="0" err="1">
+                <a:latin typeface="Courier" pitchFamily="2" charset="0"/>
+              </a:rPr>
+              <a:t>future</a:t>
+            </a:r>
+            <a:r>
+              <a:rPr lang="de-DE" sz="1100" dirty="0">
+                <a:latin typeface="Courier" pitchFamily="2" charset="0"/>
+              </a:rPr>
+              <a:t> log </a:t>
+            </a:r>
+            <a:r>
+              <a:rPr lang="de-DE" sz="1100" dirty="0" err="1">
+                <a:latin typeface="Courier" pitchFamily="2" charset="0"/>
+              </a:rPr>
+              <a:t>entries</a:t>
+            </a:r>
+            <a:br>
+              <a:rPr lang="de-DE" sz="1100" dirty="0">
+                <a:latin typeface="Courier" pitchFamily="2" charset="0"/>
+              </a:rPr>
+            </a:br>
+            <a:br>
+              <a:rPr lang="de-DE" sz="1100" dirty="0">
+                <a:latin typeface="Courier" pitchFamily="2" charset="0"/>
+              </a:rPr>
+            </a:br>
+            <a:r>
+              <a:rPr lang="de-DE" sz="1100" dirty="0">
+                <a:latin typeface="Courier" pitchFamily="2" charset="0"/>
+              </a:rPr>
+              <a:t># </a:t>
+            </a:r>
+            <a:r>
+              <a:rPr lang="de-DE" sz="1100" dirty="0" err="1">
+                <a:latin typeface="Courier" pitchFamily="2" charset="0"/>
+              </a:rPr>
+              <a:t>Where</a:t>
+            </a:r>
+            <a:r>
+              <a:rPr lang="de-DE" sz="1100" dirty="0">
+                <a:latin typeface="Courier" pitchFamily="2" charset="0"/>
+              </a:rPr>
+              <a:t> </a:t>
+            </a:r>
+            <a:r>
+              <a:rPr lang="de-DE" sz="1100" dirty="0" err="1">
+                <a:latin typeface="Courier" pitchFamily="2" charset="0"/>
+              </a:rPr>
+              <a:t>to</a:t>
+            </a:r>
+            <a:r>
+              <a:rPr lang="de-DE" sz="1100" dirty="0">
+                <a:latin typeface="Courier" pitchFamily="2" charset="0"/>
+              </a:rPr>
+              <a:t> </a:t>
+            </a:r>
+            <a:r>
+              <a:rPr lang="de-DE" sz="1100" dirty="0" err="1">
+                <a:latin typeface="Courier" pitchFamily="2" charset="0"/>
+              </a:rPr>
+              <a:t>forward</a:t>
+            </a:r>
+            <a:r>
+              <a:rPr lang="de-DE" sz="1100" dirty="0">
+                <a:latin typeface="Courier" pitchFamily="2" charset="0"/>
+              </a:rPr>
+              <a:t> </a:t>
+            </a:r>
+            <a:r>
+              <a:rPr lang="de-DE" sz="1100" dirty="0" err="1">
+                <a:latin typeface="Courier" pitchFamily="2" charset="0"/>
+              </a:rPr>
+              <a:t>the</a:t>
+            </a:r>
+            <a:r>
+              <a:rPr lang="de-DE" sz="1100" dirty="0">
+                <a:latin typeface="Courier" pitchFamily="2" charset="0"/>
+              </a:rPr>
+              <a:t> log </a:t>
+            </a:r>
+            <a:r>
+              <a:rPr lang="de-DE" sz="1100" dirty="0" err="1">
+                <a:latin typeface="Courier" pitchFamily="2" charset="0"/>
+              </a:rPr>
+              <a:t>entries</a:t>
+            </a:r>
+            <a:r>
+              <a:rPr lang="de-DE" sz="1100" dirty="0">
+                <a:latin typeface="Courier" pitchFamily="2" charset="0"/>
+              </a:rPr>
+              <a:t> </a:t>
+            </a:r>
+            <a:r>
+              <a:rPr lang="de-DE" sz="1100" dirty="0" err="1">
+                <a:latin typeface="Courier" pitchFamily="2" charset="0"/>
+              </a:rPr>
+              <a:t>to</a:t>
+            </a:r>
+            <a:r>
+              <a:rPr lang="de-DE" sz="1100" dirty="0">
+                <a:latin typeface="Courier" pitchFamily="2" charset="0"/>
+              </a:rPr>
+              <a:t>:</a:t>
+            </a:r>
+            <a:br>
+              <a:rPr lang="de-DE" sz="1100" dirty="0">
+                <a:latin typeface="Courier" pitchFamily="2" charset="0"/>
+              </a:rPr>
+            </a:br>
+            <a:br>
+              <a:rPr lang="de-DE" sz="1100" dirty="0">
+                <a:latin typeface="Courier" pitchFamily="2" charset="0"/>
+              </a:rPr>
+            </a:br>
+            <a:r>
+              <a:rPr lang="de-DE" sz="1100" dirty="0" err="1">
+                <a:latin typeface="Courier" pitchFamily="2" charset="0"/>
+              </a:rPr>
+              <a:t>dest</a:t>
+            </a:r>
+            <a:r>
+              <a:rPr lang="de-DE" sz="1100" dirty="0">
+                <a:latin typeface="Courier" pitchFamily="2" charset="0"/>
+              </a:rPr>
+              <a:t>: </a:t>
+            </a:r>
+            <a:r>
+              <a:rPr lang="de-DE" sz="1100" dirty="0" err="1">
+                <a:latin typeface="Courier" pitchFamily="2" charset="0"/>
+              </a:rPr>
+              <a:t>syslog</a:t>
+            </a:r>
+            <a:r>
+              <a:rPr lang="de-DE" sz="1100" dirty="0">
+                <a:latin typeface="Courier" pitchFamily="2" charset="0"/>
+              </a:rPr>
+              <a:t>               # Destination </a:t>
+            </a:r>
+            <a:r>
+              <a:rPr lang="de-DE" sz="1100" dirty="0" err="1">
+                <a:latin typeface="Courier" pitchFamily="2" charset="0"/>
+              </a:rPr>
+              <a:t>for</a:t>
+            </a:r>
+            <a:r>
+              <a:rPr lang="de-DE" sz="1100" dirty="0">
+                <a:latin typeface="Courier" pitchFamily="2" charset="0"/>
+              </a:rPr>
+              <a:t> </a:t>
+            </a:r>
+            <a:r>
+              <a:rPr lang="de-DE" sz="1100" dirty="0" err="1">
+                <a:latin typeface="Courier" pitchFamily="2" charset="0"/>
+              </a:rPr>
+              <a:t>the</a:t>
+            </a:r>
+            <a:r>
+              <a:rPr lang="de-DE" sz="1100" dirty="0">
+                <a:latin typeface="Courier" pitchFamily="2" charset="0"/>
+              </a:rPr>
+              <a:t> log </a:t>
+            </a:r>
+            <a:r>
+              <a:rPr lang="de-DE" sz="1100" dirty="0" err="1">
+                <a:latin typeface="Courier" pitchFamily="2" charset="0"/>
+              </a:rPr>
+              <a:t>entries</a:t>
+            </a:r>
+            <a:r>
+              <a:rPr lang="de-DE" sz="1100" dirty="0">
+                <a:latin typeface="Courier" pitchFamily="2" charset="0"/>
+              </a:rPr>
+              <a:t>: </a:t>
+            </a:r>
+            <a:r>
+              <a:rPr lang="de-DE" sz="1100" dirty="0" err="1">
+                <a:latin typeface="Courier" pitchFamily="2" charset="0"/>
+              </a:rPr>
+              <a:t>stdout</a:t>
+            </a:r>
+            <a:r>
+              <a:rPr lang="de-DE" sz="1100" dirty="0">
+                <a:latin typeface="Courier" pitchFamily="2" charset="0"/>
+              </a:rPr>
+              <a:t>, </a:t>
+            </a:r>
+            <a:r>
+              <a:rPr lang="de-DE" sz="1100" dirty="0" err="1">
+                <a:latin typeface="Courier" pitchFamily="2" charset="0"/>
+              </a:rPr>
+              <a:t>syslog</a:t>
+            </a:r>
+            <a:br>
+              <a:rPr lang="de-DE" sz="1100" dirty="0">
+                <a:latin typeface="Courier" pitchFamily="2" charset="0"/>
+              </a:rPr>
+            </a:br>
+            <a:r>
+              <a:rPr lang="de-DE" sz="1100" dirty="0" err="1">
+                <a:latin typeface="Courier" pitchFamily="2" charset="0"/>
+              </a:rPr>
+              <a:t>syslog_host</a:t>
+            </a:r>
+            <a:r>
+              <a:rPr lang="de-DE" sz="1100" dirty="0">
+                <a:latin typeface="Courier" pitchFamily="2" charset="0"/>
+              </a:rPr>
+              <a:t>: 10.11.12.14   # IP </a:t>
             </a:r>
             <a:r>
               <a:rPr lang="de-DE" sz="1100" dirty="0" err="1">
@@ -4555,30 +5334,95 @@
               <a:rPr lang="de-DE" sz="1100" dirty="0">
                 <a:latin typeface="Courier" pitchFamily="2" charset="0"/>
               </a:rPr>
-              <a:t> </a:t>
-            </a:r>
-            <a:r>
-              <a:rPr lang="de-DE" sz="1100" dirty="0" err="1">
-                <a:latin typeface="Courier" pitchFamily="2" charset="0"/>
-              </a:rPr>
-              <a:t>the</a:t>
-            </a:r>
-            <a:r>
-              <a:rPr lang="de-DE" sz="1100" dirty="0">
-                <a:latin typeface="Courier" pitchFamily="2" charset="0"/>
-              </a:rPr>
-              <a:t> HMC</a:t>
-            </a:r>
-            <a:br>
-              <a:rPr lang="de-DE" sz="1100" dirty="0">
-                <a:latin typeface="Courier" pitchFamily="2" charset="0"/>
-              </a:rPr>
-            </a:br>
-            <a:r>
-              <a:rPr lang="de-DE" sz="1100" dirty="0" err="1">
-                <a:latin typeface="Courier" pitchFamily="2" charset="0"/>
-              </a:rPr>
-              <a:t>hmc_user</a:t>
+              <a:t> remote </a:t>
+            </a:r>
+            <a:r>
+              <a:rPr lang="de-DE" sz="1100" dirty="0" err="1">
+                <a:latin typeface="Courier" pitchFamily="2" charset="0"/>
+              </a:rPr>
+              <a:t>syslog</a:t>
+            </a:r>
+            <a:r>
+              <a:rPr lang="de-DE" sz="1100" dirty="0">
+                <a:latin typeface="Courier" pitchFamily="2" charset="0"/>
+              </a:rPr>
+              <a:t> </a:t>
+            </a:r>
+            <a:r>
+              <a:rPr lang="de-DE" sz="1100" dirty="0" err="1">
+                <a:latin typeface="Courier" pitchFamily="2" charset="0"/>
+              </a:rPr>
+              <a:t>server</a:t>
+            </a:r>
+            <a:br>
+              <a:rPr lang="de-DE" sz="1100" dirty="0">
+                <a:latin typeface="Courier" pitchFamily="2" charset="0"/>
+              </a:rPr>
+            </a:br>
+            <a:r>
+              <a:rPr lang="de-DE" sz="1100" dirty="0" err="1">
+                <a:latin typeface="Courier" pitchFamily="2" charset="0"/>
+              </a:rPr>
+              <a:t>syslog_port</a:t>
+            </a:r>
+            <a:r>
+              <a:rPr lang="de-DE" sz="1100" dirty="0">
+                <a:latin typeface="Courier" pitchFamily="2" charset="0"/>
+              </a:rPr>
+              <a:t>: 514           # Port </a:t>
+            </a:r>
+            <a:r>
+              <a:rPr lang="de-DE" sz="1100" dirty="0" err="1">
+                <a:latin typeface="Courier" pitchFamily="2" charset="0"/>
+              </a:rPr>
+              <a:t>number</a:t>
+            </a:r>
+            <a:r>
+              <a:rPr lang="de-DE" sz="1100" dirty="0">
+                <a:latin typeface="Courier" pitchFamily="2" charset="0"/>
+              </a:rPr>
+              <a:t> </a:t>
+            </a:r>
+            <a:r>
+              <a:rPr lang="de-DE" sz="1100" dirty="0" err="1">
+                <a:latin typeface="Courier" pitchFamily="2" charset="0"/>
+              </a:rPr>
+              <a:t>of</a:t>
+            </a:r>
+            <a:r>
+              <a:rPr lang="de-DE" sz="1100" dirty="0">
+                <a:latin typeface="Courier" pitchFamily="2" charset="0"/>
+              </a:rPr>
+              <a:t> remote </a:t>
+            </a:r>
+            <a:r>
+              <a:rPr lang="de-DE" sz="1100" dirty="0" err="1">
+                <a:latin typeface="Courier" pitchFamily="2" charset="0"/>
+              </a:rPr>
+              <a:t>syslog</a:t>
+            </a:r>
+            <a:r>
+              <a:rPr lang="de-DE" sz="1100" dirty="0">
+                <a:latin typeface="Courier" pitchFamily="2" charset="0"/>
+              </a:rPr>
+              <a:t> </a:t>
+            </a:r>
+            <a:r>
+              <a:rPr lang="de-DE" sz="1100" dirty="0" err="1">
+                <a:latin typeface="Courier" pitchFamily="2" charset="0"/>
+              </a:rPr>
+              <a:t>server</a:t>
+            </a:r>
+            <a:br>
+              <a:rPr lang="de-DE" sz="1100" dirty="0">
+                <a:latin typeface="Courier" pitchFamily="2" charset="0"/>
+              </a:rPr>
+            </a:br>
+            <a:r>
+              <a:rPr lang="de-DE" sz="1100" dirty="0" err="1">
+                <a:latin typeface="Courier" pitchFamily="2" charset="0"/>
+              </a:rPr>
+              <a:t>syslog_porttype</a:t>
             </a:r>
             <a:r>
               <a:rPr lang="de-DE" sz="1100" dirty="0">
@@ -4590,30 +5434,54 @@
               <a:rPr lang="de-DE" sz="1100" dirty="0" err="1">
                 <a:latin typeface="Courier" pitchFamily="2" charset="0"/>
               </a:rPr>
-              <a:t>myuser</a:t>
-            </a:r>
-            <a:r>
-              <a:rPr lang="de-DE" sz="1100" dirty="0">
-                <a:latin typeface="Courier" pitchFamily="2" charset="0"/>
-              </a:rPr>
-              <a:t>           # HMC </a:t>
-            </a:r>
-            <a:r>
-              <a:rPr lang="de-DE" sz="1100" dirty="0" err="1">
-                <a:latin typeface="Courier" pitchFamily="2" charset="0"/>
-              </a:rPr>
-              <a:t>userid</a:t>
-            </a:r>
-            <a:br>
-              <a:rPr lang="de-DE" sz="1100" dirty="0">
-                <a:latin typeface="Courier" pitchFamily="2" charset="0"/>
-              </a:rPr>
-            </a:br>
-            <a:r>
-              <a:rPr lang="de-DE" sz="1100" dirty="0" err="1">
-                <a:latin typeface="Courier" pitchFamily="2" charset="0"/>
-              </a:rPr>
-              <a:t>hmc_password</a:t>
+              <a:t>udp</a:t>
+            </a:r>
+            <a:r>
+              <a:rPr lang="de-DE" sz="1100" dirty="0">
+                <a:latin typeface="Courier" pitchFamily="2" charset="0"/>
+              </a:rPr>
+              <a:t>       # Port type </a:t>
+            </a:r>
+            <a:r>
+              <a:rPr lang="de-DE" sz="1100" dirty="0" err="1">
+                <a:latin typeface="Courier" pitchFamily="2" charset="0"/>
+              </a:rPr>
+              <a:t>of</a:t>
+            </a:r>
+            <a:r>
+              <a:rPr lang="de-DE" sz="1100" dirty="0">
+                <a:latin typeface="Courier" pitchFamily="2" charset="0"/>
+              </a:rPr>
+              <a:t> remote </a:t>
+            </a:r>
+            <a:r>
+              <a:rPr lang="de-DE" sz="1100" dirty="0" err="1">
+                <a:latin typeface="Courier" pitchFamily="2" charset="0"/>
+              </a:rPr>
+              <a:t>syslog</a:t>
+            </a:r>
+            <a:r>
+              <a:rPr lang="de-DE" sz="1100" dirty="0">
+                <a:latin typeface="Courier" pitchFamily="2" charset="0"/>
+              </a:rPr>
+              <a:t> </a:t>
+            </a:r>
+            <a:r>
+              <a:rPr lang="de-DE" sz="1100" dirty="0" err="1">
+                <a:latin typeface="Courier" pitchFamily="2" charset="0"/>
+              </a:rPr>
+              <a:t>server</a:t>
+            </a:r>
+            <a:br>
+              <a:rPr lang="de-DE" sz="1100" dirty="0">
+                <a:latin typeface="Courier" pitchFamily="2" charset="0"/>
+              </a:rPr>
+            </a:br>
+            <a:r>
+              <a:rPr lang="de-DE" sz="1100" dirty="0" err="1">
+                <a:latin typeface="Courier" pitchFamily="2" charset="0"/>
+              </a:rPr>
+              <a:t>syslog_facility</a:t>
             </a:r>
             <a:r>
               <a:rPr lang="de-DE" sz="1100" dirty="0">
@@ -4625,578 +5493,43 @@
               <a:rPr lang="de-DE" sz="1100" dirty="0" err="1">
                 <a:latin typeface="Courier" pitchFamily="2" charset="0"/>
               </a:rPr>
-              <a:t>mypassword</a:t>
-            </a:r>
-            <a:r>
-              <a:rPr lang="de-DE" sz="1100" dirty="0">
-                <a:latin typeface="Courier" pitchFamily="2" charset="0"/>
-              </a:rPr>
-              <a:t>   # HMC </a:t>
-            </a:r>
-            <a:r>
-              <a:rPr lang="de-DE" sz="1100" dirty="0" err="1">
-                <a:latin typeface="Courier" pitchFamily="2" charset="0"/>
-              </a:rPr>
-              <a:t>password</a:t>
-            </a:r>
-            <a:br>
-              <a:rPr lang="de-DE" sz="1100" dirty="0">
-                <a:latin typeface="Courier" pitchFamily="2" charset="0"/>
-              </a:rPr>
-            </a:br>
-            <a:br>
-              <a:rPr lang="de-DE" sz="1100" dirty="0">
-                <a:latin typeface="Courier" pitchFamily="2" charset="0"/>
-              </a:rPr>
-            </a:br>
-            <a:r>
-              <a:rPr lang="de-DE" sz="1100" dirty="0">
-                <a:latin typeface="Courier" pitchFamily="2" charset="0"/>
-              </a:rPr>
-              <a:t># </a:t>
-            </a:r>
-            <a:r>
-              <a:rPr lang="de-DE" sz="1100" dirty="0" err="1">
-                <a:latin typeface="Courier" pitchFamily="2" charset="0"/>
-              </a:rPr>
-              <a:t>Which</a:t>
-            </a:r>
-            <a:r>
-              <a:rPr lang="de-DE" sz="1100" dirty="0">
-                <a:latin typeface="Courier" pitchFamily="2" charset="0"/>
-              </a:rPr>
-              <a:t> log </a:t>
-            </a:r>
-            <a:r>
-              <a:rPr lang="de-DE" sz="1100" dirty="0" err="1">
-                <a:latin typeface="Courier" pitchFamily="2" charset="0"/>
-              </a:rPr>
-              <a:t>entries</a:t>
-            </a:r>
-            <a:r>
-              <a:rPr lang="de-DE" sz="1100" dirty="0">
-                <a:latin typeface="Courier" pitchFamily="2" charset="0"/>
-              </a:rPr>
-              <a:t> </a:t>
-            </a:r>
-            <a:r>
-              <a:rPr lang="de-DE" sz="1100" dirty="0" err="1">
-                <a:latin typeface="Courier" pitchFamily="2" charset="0"/>
-              </a:rPr>
-              <a:t>to</a:t>
-            </a:r>
-            <a:r>
-              <a:rPr lang="de-DE" sz="1100" dirty="0">
-                <a:latin typeface="Courier" pitchFamily="2" charset="0"/>
-              </a:rPr>
-              <a:t> </a:t>
-            </a:r>
-            <a:r>
-              <a:rPr lang="de-DE" sz="1100" dirty="0" err="1">
-                <a:latin typeface="Courier" pitchFamily="2" charset="0"/>
-              </a:rPr>
-              <a:t>collect</a:t>
-            </a:r>
-            <a:r>
-              <a:rPr lang="de-DE" sz="1100" dirty="0">
-                <a:latin typeface="Courier" pitchFamily="2" charset="0"/>
-              </a:rPr>
-              <a:t>:</a:t>
-            </a:r>
-            <a:br>
-              <a:rPr lang="de-DE" sz="1100" dirty="0">
-                <a:latin typeface="Courier" pitchFamily="2" charset="0"/>
-              </a:rPr>
-            </a:br>
-            <a:br>
-              <a:rPr lang="de-DE" sz="1100" dirty="0">
-                <a:latin typeface="Courier" pitchFamily="2" charset="0"/>
-              </a:rPr>
-            </a:br>
-            <a:r>
-              <a:rPr lang="de-DE" sz="1100" dirty="0" err="1">
-                <a:latin typeface="Courier" pitchFamily="2" charset="0"/>
-              </a:rPr>
-              <a:t>logs</a:t>
-            </a:r>
-            <a:r>
-              <a:rPr lang="de-DE" sz="1100" dirty="0">
-                <a:latin typeface="Courier" pitchFamily="2" charset="0"/>
-              </a:rPr>
-              <a:t>: [</a:t>
-            </a:r>
-            <a:r>
-              <a:rPr lang="de-DE" sz="1100" dirty="0" err="1">
-                <a:latin typeface="Courier" pitchFamily="2" charset="0"/>
-              </a:rPr>
-              <a:t>security</a:t>
-            </a:r>
-            <a:r>
-              <a:rPr lang="de-DE" sz="1100" dirty="0">
-                <a:latin typeface="Courier" pitchFamily="2" charset="0"/>
-              </a:rPr>
-              <a:t>, </a:t>
-            </a:r>
-            <a:r>
-              <a:rPr lang="de-DE" sz="1100" dirty="0" err="1">
-                <a:latin typeface="Courier" pitchFamily="2" charset="0"/>
-              </a:rPr>
-              <a:t>audit</a:t>
-            </a:r>
-            <a:r>
-              <a:rPr lang="de-DE" sz="1100" dirty="0">
-                <a:latin typeface="Courier" pitchFamily="2" charset="0"/>
-              </a:rPr>
-              <a:t>]    # List </a:t>
-            </a:r>
-            <a:r>
-              <a:rPr lang="de-DE" sz="1100" dirty="0" err="1">
-                <a:latin typeface="Courier" pitchFamily="2" charset="0"/>
-              </a:rPr>
-              <a:t>of</a:t>
-            </a:r>
-            <a:r>
-              <a:rPr lang="de-DE" sz="1100" dirty="0">
-                <a:latin typeface="Courier" pitchFamily="2" charset="0"/>
-              </a:rPr>
-              <a:t> log </a:t>
-            </a:r>
-            <a:r>
-              <a:rPr lang="de-DE" sz="1100" dirty="0" err="1">
-                <a:latin typeface="Courier" pitchFamily="2" charset="0"/>
-              </a:rPr>
-              <a:t>types</a:t>
-            </a:r>
-            <a:r>
-              <a:rPr lang="de-DE" sz="1100" dirty="0">
-                <a:latin typeface="Courier" pitchFamily="2" charset="0"/>
-              </a:rPr>
-              <a:t> </a:t>
-            </a:r>
-            <a:r>
-              <a:rPr lang="de-DE" sz="1100" dirty="0" err="1">
-                <a:latin typeface="Courier" pitchFamily="2" charset="0"/>
-              </a:rPr>
-              <a:t>to</a:t>
-            </a:r>
-            <a:r>
-              <a:rPr lang="de-DE" sz="1100" dirty="0">
-                <a:latin typeface="Courier" pitchFamily="2" charset="0"/>
-              </a:rPr>
-              <a:t> </a:t>
-            </a:r>
-            <a:r>
-              <a:rPr lang="de-DE" sz="1100" dirty="0" err="1">
-                <a:latin typeface="Courier" pitchFamily="2" charset="0"/>
-              </a:rPr>
-              <a:t>include</a:t>
-            </a:r>
-            <a:br>
-              <a:rPr lang="de-DE" sz="1100" dirty="0">
-                <a:latin typeface="Courier" pitchFamily="2" charset="0"/>
-              </a:rPr>
-            </a:br>
-            <a:r>
-              <a:rPr lang="de-DE" sz="1100" dirty="0" err="1">
-                <a:latin typeface="Courier" pitchFamily="2" charset="0"/>
-              </a:rPr>
-              <a:t>since</a:t>
-            </a:r>
-            <a:r>
-              <a:rPr lang="de-DE" sz="1100" dirty="0">
-                <a:latin typeface="Courier" pitchFamily="2" charset="0"/>
-              </a:rPr>
-              <a:t>: </a:t>
-            </a:r>
-            <a:r>
-              <a:rPr lang="de-DE" sz="1100" dirty="0" err="1">
-                <a:latin typeface="Courier" pitchFamily="2" charset="0"/>
-              </a:rPr>
-              <a:t>now</a:t>
-            </a:r>
-            <a:r>
-              <a:rPr lang="de-DE" sz="1100" dirty="0">
-                <a:latin typeface="Courier" pitchFamily="2" charset="0"/>
-              </a:rPr>
-              <a:t>                 # </a:t>
-            </a:r>
-            <a:r>
-              <a:rPr lang="de-DE" sz="1100" dirty="0" err="1">
-                <a:latin typeface="Courier" pitchFamily="2" charset="0"/>
-              </a:rPr>
-              <a:t>Include</a:t>
-            </a:r>
-            <a:r>
-              <a:rPr lang="de-DE" sz="1100" dirty="0">
-                <a:latin typeface="Courier" pitchFamily="2" charset="0"/>
-              </a:rPr>
-              <a:t> </a:t>
-            </a:r>
-            <a:r>
-              <a:rPr lang="de-DE" sz="1100" dirty="0" err="1">
-                <a:latin typeface="Courier" pitchFamily="2" charset="0"/>
-              </a:rPr>
-              <a:t>past</a:t>
-            </a:r>
-            <a:r>
-              <a:rPr lang="de-DE" sz="1100" dirty="0">
-                <a:latin typeface="Courier" pitchFamily="2" charset="0"/>
-              </a:rPr>
-              <a:t> log </a:t>
-            </a:r>
-            <a:r>
-              <a:rPr lang="de-DE" sz="1100" dirty="0" err="1">
-                <a:latin typeface="Courier" pitchFamily="2" charset="0"/>
-              </a:rPr>
-              <a:t>entries</a:t>
-            </a:r>
-            <a:r>
-              <a:rPr lang="de-DE" sz="1100" dirty="0">
-                <a:latin typeface="Courier" pitchFamily="2" charset="0"/>
-              </a:rPr>
-              <a:t> </a:t>
-            </a:r>
-            <a:r>
-              <a:rPr lang="de-DE" sz="1100" dirty="0" err="1">
-                <a:latin typeface="Courier" pitchFamily="2" charset="0"/>
-              </a:rPr>
-              <a:t>since</a:t>
-            </a:r>
-            <a:r>
-              <a:rPr lang="de-DE" sz="1100" dirty="0">
-                <a:latin typeface="Courier" pitchFamily="2" charset="0"/>
-              </a:rPr>
-              <a:t> </a:t>
-            </a:r>
-            <a:r>
-              <a:rPr lang="de-DE" sz="1100" dirty="0" err="1">
-                <a:latin typeface="Courier" pitchFamily="2" charset="0"/>
-              </a:rPr>
-              <a:t>when</a:t>
-            </a:r>
-            <a:r>
-              <a:rPr lang="de-DE" sz="1100" dirty="0">
-                <a:latin typeface="Courier" pitchFamily="2" charset="0"/>
-              </a:rPr>
-              <a:t>: all, </a:t>
-            </a:r>
-            <a:r>
-              <a:rPr lang="de-DE" sz="1100" dirty="0" err="1">
-                <a:latin typeface="Courier" pitchFamily="2" charset="0"/>
-              </a:rPr>
-              <a:t>now</a:t>
-            </a:r>
-            <a:r>
-              <a:rPr lang="de-DE" sz="1100" dirty="0">
-                <a:latin typeface="Courier" pitchFamily="2" charset="0"/>
-              </a:rPr>
-              <a:t>, </a:t>
-            </a:r>
-            <a:r>
-              <a:rPr lang="de-DE" sz="1100" dirty="0" err="1">
-                <a:latin typeface="Courier" pitchFamily="2" charset="0"/>
-              </a:rPr>
-              <a:t>date&amp;time</a:t>
-            </a:r>
-            <a:r>
-              <a:rPr lang="de-DE" sz="1100" dirty="0">
-                <a:latin typeface="Courier" pitchFamily="2" charset="0"/>
-              </a:rPr>
-              <a:t> </a:t>
-            </a:r>
-            <a:r>
-              <a:rPr lang="de-DE" sz="1100" dirty="0" err="1">
-                <a:latin typeface="Courier" pitchFamily="2" charset="0"/>
-              </a:rPr>
-              <a:t>string</a:t>
-            </a:r>
-            <a:br>
-              <a:rPr lang="de-DE" sz="1100" dirty="0">
-                <a:latin typeface="Courier" pitchFamily="2" charset="0"/>
-              </a:rPr>
-            </a:br>
-            <a:r>
-              <a:rPr lang="de-DE" sz="1100" dirty="0" err="1">
-                <a:latin typeface="Courier" pitchFamily="2" charset="0"/>
-              </a:rPr>
-              <a:t>future</a:t>
-            </a:r>
-            <a:r>
-              <a:rPr lang="de-DE" sz="1100" dirty="0">
-                <a:latin typeface="Courier" pitchFamily="2" charset="0"/>
-              </a:rPr>
-              <a:t>: </a:t>
-            </a:r>
-            <a:r>
-              <a:rPr lang="de-DE" sz="1100" dirty="0" err="1">
-                <a:latin typeface="Courier" pitchFamily="2" charset="0"/>
-              </a:rPr>
-              <a:t>true</a:t>
-            </a:r>
-            <a:r>
-              <a:rPr lang="de-DE" sz="1100" dirty="0">
-                <a:latin typeface="Courier" pitchFamily="2" charset="0"/>
-              </a:rPr>
-              <a:t>               # </a:t>
-            </a:r>
-            <a:r>
-              <a:rPr lang="de-DE" sz="1100" dirty="0" err="1">
-                <a:latin typeface="Courier" pitchFamily="2" charset="0"/>
-              </a:rPr>
-              <a:t>Wait</a:t>
-            </a:r>
-            <a:r>
-              <a:rPr lang="de-DE" sz="1100" dirty="0">
-                <a:latin typeface="Courier" pitchFamily="2" charset="0"/>
-              </a:rPr>
-              <a:t> </a:t>
-            </a:r>
-            <a:r>
-              <a:rPr lang="de-DE" sz="1100" dirty="0" err="1">
-                <a:latin typeface="Courier" pitchFamily="2" charset="0"/>
-              </a:rPr>
-              <a:t>for</a:t>
-            </a:r>
-            <a:r>
-              <a:rPr lang="de-DE" sz="1100" dirty="0">
-                <a:latin typeface="Courier" pitchFamily="2" charset="0"/>
-              </a:rPr>
-              <a:t> </a:t>
-            </a:r>
-            <a:r>
-              <a:rPr lang="de-DE" sz="1100" dirty="0" err="1">
-                <a:latin typeface="Courier" pitchFamily="2" charset="0"/>
-              </a:rPr>
-              <a:t>future</a:t>
-            </a:r>
-            <a:r>
-              <a:rPr lang="de-DE" sz="1100" dirty="0">
-                <a:latin typeface="Courier" pitchFamily="2" charset="0"/>
-              </a:rPr>
-              <a:t> log </a:t>
-            </a:r>
-            <a:r>
-              <a:rPr lang="de-DE" sz="1100" dirty="0" err="1">
-                <a:latin typeface="Courier" pitchFamily="2" charset="0"/>
-              </a:rPr>
-              <a:t>entries</a:t>
-            </a:r>
-            <a:br>
-              <a:rPr lang="de-DE" sz="1100" dirty="0">
-                <a:latin typeface="Courier" pitchFamily="2" charset="0"/>
-              </a:rPr>
-            </a:br>
-            <a:br>
-              <a:rPr lang="de-DE" sz="1100" dirty="0">
-                <a:latin typeface="Courier" pitchFamily="2" charset="0"/>
-              </a:rPr>
-            </a:br>
-            <a:r>
-              <a:rPr lang="de-DE" sz="1100" dirty="0">
-                <a:latin typeface="Courier" pitchFamily="2" charset="0"/>
-              </a:rPr>
-              <a:t># </a:t>
-            </a:r>
-            <a:r>
-              <a:rPr lang="de-DE" sz="1100" dirty="0" err="1">
-                <a:latin typeface="Courier" pitchFamily="2" charset="0"/>
-              </a:rPr>
-              <a:t>What</a:t>
-            </a:r>
-            <a:r>
-              <a:rPr lang="de-DE" sz="1100" dirty="0">
-                <a:latin typeface="Courier" pitchFamily="2" charset="0"/>
-              </a:rPr>
-              <a:t> </a:t>
-            </a:r>
-            <a:r>
-              <a:rPr lang="de-DE" sz="1100" dirty="0" err="1">
-                <a:latin typeface="Courier" pitchFamily="2" charset="0"/>
-              </a:rPr>
-              <a:t>to</a:t>
-            </a:r>
-            <a:r>
-              <a:rPr lang="de-DE" sz="1100" dirty="0">
-                <a:latin typeface="Courier" pitchFamily="2" charset="0"/>
-              </a:rPr>
-              <a:t> do </a:t>
-            </a:r>
-            <a:r>
-              <a:rPr lang="de-DE" sz="1100" dirty="0" err="1">
-                <a:latin typeface="Courier" pitchFamily="2" charset="0"/>
-              </a:rPr>
-              <a:t>with</a:t>
-            </a:r>
-            <a:r>
-              <a:rPr lang="de-DE" sz="1100" dirty="0">
-                <a:latin typeface="Courier" pitchFamily="2" charset="0"/>
-              </a:rPr>
-              <a:t> </a:t>
-            </a:r>
-            <a:r>
-              <a:rPr lang="de-DE" sz="1100" dirty="0" err="1">
-                <a:latin typeface="Courier" pitchFamily="2" charset="0"/>
-              </a:rPr>
-              <a:t>the</a:t>
-            </a:r>
-            <a:r>
-              <a:rPr lang="de-DE" sz="1100" dirty="0">
-                <a:latin typeface="Courier" pitchFamily="2" charset="0"/>
-              </a:rPr>
-              <a:t> log </a:t>
-            </a:r>
-            <a:r>
-              <a:rPr lang="de-DE" sz="1100" dirty="0" err="1">
-                <a:latin typeface="Courier" pitchFamily="2" charset="0"/>
-              </a:rPr>
-              <a:t>entries</a:t>
-            </a:r>
-            <a:r>
-              <a:rPr lang="de-DE" sz="1100" dirty="0">
-                <a:latin typeface="Courier" pitchFamily="2" charset="0"/>
-              </a:rPr>
-              <a:t>:</a:t>
-            </a:r>
-            <a:br>
-              <a:rPr lang="de-DE" sz="1100" dirty="0">
-                <a:latin typeface="Courier" pitchFamily="2" charset="0"/>
-              </a:rPr>
-            </a:br>
-            <a:br>
-              <a:rPr lang="de-DE" sz="1100" dirty="0">
-                <a:latin typeface="Courier" pitchFamily="2" charset="0"/>
-              </a:rPr>
-            </a:br>
-            <a:r>
-              <a:rPr lang="de-DE" sz="1100" dirty="0" err="1">
-                <a:latin typeface="Courier" pitchFamily="2" charset="0"/>
-              </a:rPr>
-              <a:t>dest</a:t>
-            </a:r>
-            <a:r>
-              <a:rPr lang="de-DE" sz="1100" dirty="0">
-                <a:latin typeface="Courier" pitchFamily="2" charset="0"/>
-              </a:rPr>
-              <a:t>: </a:t>
-            </a:r>
-            <a:r>
-              <a:rPr lang="de-DE" sz="1100" dirty="0" err="1">
-                <a:latin typeface="Courier" pitchFamily="2" charset="0"/>
-              </a:rPr>
-              <a:t>stdout</a:t>
-            </a:r>
-            <a:r>
-              <a:rPr lang="de-DE" sz="1100" dirty="0">
-                <a:latin typeface="Courier" pitchFamily="2" charset="0"/>
-              </a:rPr>
-              <a:t>               # Destination </a:t>
-            </a:r>
-            <a:r>
-              <a:rPr lang="de-DE" sz="1100" dirty="0" err="1">
-                <a:latin typeface="Courier" pitchFamily="2" charset="0"/>
-              </a:rPr>
-              <a:t>for</a:t>
-            </a:r>
-            <a:r>
-              <a:rPr lang="de-DE" sz="1100" dirty="0">
-                <a:latin typeface="Courier" pitchFamily="2" charset="0"/>
-              </a:rPr>
-              <a:t> </a:t>
-            </a:r>
-            <a:r>
-              <a:rPr lang="de-DE" sz="1100" dirty="0" err="1">
-                <a:latin typeface="Courier" pitchFamily="2" charset="0"/>
-              </a:rPr>
-              <a:t>the</a:t>
-            </a:r>
-            <a:r>
-              <a:rPr lang="de-DE" sz="1100" dirty="0">
-                <a:latin typeface="Courier" pitchFamily="2" charset="0"/>
-              </a:rPr>
-              <a:t> log </a:t>
-            </a:r>
-            <a:r>
-              <a:rPr lang="de-DE" sz="1100" dirty="0" err="1">
-                <a:latin typeface="Courier" pitchFamily="2" charset="0"/>
-              </a:rPr>
-              <a:t>entries</a:t>
-            </a:r>
-            <a:r>
-              <a:rPr lang="de-DE" sz="1100" dirty="0">
-                <a:latin typeface="Courier" pitchFamily="2" charset="0"/>
-              </a:rPr>
-              <a:t>: </a:t>
-            </a:r>
-            <a:r>
-              <a:rPr lang="de-DE" sz="1100" dirty="0" err="1">
-                <a:latin typeface="Courier" pitchFamily="2" charset="0"/>
-              </a:rPr>
-              <a:t>stdout</a:t>
-            </a:r>
-            <a:r>
-              <a:rPr lang="de-DE" sz="1100" dirty="0">
-                <a:latin typeface="Courier" pitchFamily="2" charset="0"/>
-              </a:rPr>
-              <a:t>, </a:t>
-            </a:r>
-            <a:r>
-              <a:rPr lang="de-DE" sz="1100" dirty="0" err="1">
-                <a:latin typeface="Courier" pitchFamily="2" charset="0"/>
-              </a:rPr>
-              <a:t>syslog</a:t>
-            </a:r>
-            <a:br>
-              <a:rPr lang="de-DE" sz="1100" dirty="0">
-                <a:latin typeface="Courier" pitchFamily="2" charset="0"/>
-              </a:rPr>
-            </a:br>
-            <a:r>
-              <a:rPr lang="de-DE" sz="1100" dirty="0">
-                <a:latin typeface="Courier" pitchFamily="2" charset="0"/>
-              </a:rPr>
-              <a:t># TBD: </a:t>
-            </a:r>
-            <a:r>
-              <a:rPr lang="de-DE" sz="1100" dirty="0" err="1">
-                <a:latin typeface="Courier" pitchFamily="2" charset="0"/>
-              </a:rPr>
-              <a:t>parameters</a:t>
-            </a:r>
-            <a:r>
-              <a:rPr lang="de-DE" sz="1100" dirty="0">
-                <a:latin typeface="Courier" pitchFamily="2" charset="0"/>
-              </a:rPr>
-              <a:t> </a:t>
-            </a:r>
-            <a:r>
-              <a:rPr lang="de-DE" sz="1100" dirty="0" err="1">
-                <a:latin typeface="Courier" pitchFamily="2" charset="0"/>
-              </a:rPr>
-              <a:t>for</a:t>
-            </a:r>
-            <a:r>
-              <a:rPr lang="de-DE" sz="1100" dirty="0">
-                <a:latin typeface="Courier" pitchFamily="2" charset="0"/>
-              </a:rPr>
-              <a:t> </a:t>
-            </a:r>
-            <a:r>
-              <a:rPr lang="de-DE" sz="1100" dirty="0" err="1">
-                <a:latin typeface="Courier" pitchFamily="2" charset="0"/>
-              </a:rPr>
-              <a:t>syslog</a:t>
-            </a:r>
-            <a:r>
-              <a:rPr lang="de-DE" sz="1100" dirty="0">
-                <a:latin typeface="Courier" pitchFamily="2" charset="0"/>
-              </a:rPr>
-              <a:t> / remote </a:t>
-            </a:r>
-            <a:r>
-              <a:rPr lang="de-DE" sz="1100" dirty="0" err="1">
-                <a:latin typeface="Courier" pitchFamily="2" charset="0"/>
-              </a:rPr>
-              <a:t>syslog</a:t>
+              <a:t>user</a:t>
+            </a:r>
+            <a:r>
+              <a:rPr lang="de-DE" sz="1100" dirty="0">
+                <a:latin typeface="Courier" pitchFamily="2" charset="0"/>
+              </a:rPr>
+              <a:t>      # </a:t>
+            </a:r>
+            <a:r>
+              <a:rPr lang="de-DE" sz="1100" dirty="0" err="1">
+                <a:latin typeface="Courier" pitchFamily="2" charset="0"/>
+              </a:rPr>
+              <a:t>Syslog</a:t>
+            </a:r>
+            <a:r>
+              <a:rPr lang="de-DE" sz="1100" dirty="0">
+                <a:latin typeface="Courier" pitchFamily="2" charset="0"/>
+              </a:rPr>
+              <a:t> </a:t>
+            </a:r>
+            <a:r>
+              <a:rPr lang="de-DE" sz="1100" dirty="0" err="1">
+                <a:latin typeface="Courier" pitchFamily="2" charset="0"/>
+              </a:rPr>
+              <a:t>facility</a:t>
+            </a:r>
+            <a:r>
+              <a:rPr lang="de-DE" sz="1100" dirty="0">
+                <a:latin typeface="Courier" pitchFamily="2" charset="0"/>
+              </a:rPr>
+              <a:t> </a:t>
+            </a:r>
+            <a:r>
+              <a:rPr lang="de-DE" sz="1100" dirty="0" err="1">
+                <a:latin typeface="Courier" pitchFamily="2" charset="0"/>
+              </a:rPr>
+              <a:t>name</a:t>
             </a:r>
             <a:br>
               <a:rPr lang="de-DE" sz="1100" dirty="0">
@@ -5409,7 +5742,19 @@
               <a:rPr lang="de-DE" sz="1100" dirty="0">
                 <a:latin typeface="Courier" pitchFamily="2" charset="0"/>
               </a:rPr>
-              <a:t>: '{time:32} {type:8}  {name:12}  {</a:t>
+              <a:t>: '{time:32} {</a:t>
+            </a:r>
+            <a:r>
+              <a:rPr lang="de-DE" sz="1100" dirty="0" err="1">
+                <a:latin typeface="Courier" pitchFamily="2" charset="0"/>
+              </a:rPr>
+              <a:t>label</a:t>
+            </a:r>
+            <a:r>
+              <a:rPr lang="de-DE" sz="1100" dirty="0">
+                <a:latin typeface="Courier" pitchFamily="2" charset="0"/>
+              </a:rPr>
+              <a:t>} {type:8} {name:12} {</a:t>
             </a:r>
             <a:r>
               <a:rPr lang="de-DE" sz="1100" dirty="0" err="1">
@@ -5421,7 +5766,7 @@
               <a:rPr lang="de-DE" sz="1100" dirty="0">
                 <a:latin typeface="Courier" pitchFamily="2" charset="0"/>
               </a:rPr>
-              <a:t>:&gt;4}  {user:20}  {</a:t>
+              <a:t>:&gt;4} {user:20} {</a:t>
             </a:r>
             <a:r>
               <a:rPr lang="de-DE" sz="1100" dirty="0" err="1">
@@ -5475,7 +5820,7 @@
             </a:r>
             <a:r>
               <a:rPr lang="de-DE" sz="1200" dirty="0"/>
-              <a:t>: The time </a:t>
+              <a:t>:   The time </a:t>
             </a:r>
             <a:r>
               <a:rPr lang="de-DE" sz="1200" dirty="0" err="1"/>
@@ -5513,23 +5858,10 @@
               <a:rPr lang="de-DE" sz="1200" dirty="0"/>
             </a:br>
             <a:r>
-              <a:rPr lang="de-DE" sz="1200" dirty="0">
-                <a:latin typeface="Courier" pitchFamily="2" charset="0"/>
-              </a:rPr>
-              <a:t>type</a:t>
-            </a:r>
-            <a:r>
-              <a:rPr lang="de-DE" sz="1200" dirty="0"/>
-              <a:t>: The log type: Security, Audit.</a:t>
-            </a:r>
-            <a:br>
-              <a:rPr lang="de-DE" sz="1200" dirty="0"/>
-            </a:br>
-            <a:r>
               <a:rPr lang="de-DE" sz="1200" dirty="0" err="1">
                 <a:latin typeface="Courier" pitchFamily="2" charset="0"/>
               </a:rPr>
-              <a:t>name</a:t>
+              <a:t>label</a:t>
             </a:r>
             <a:r>
               <a:rPr lang="de-DE" sz="1200" dirty="0"/>
@@ -5537,6 +5869,88 @@
             </a:r>
             <a:r>
               <a:rPr lang="de-DE" sz="1200" dirty="0" err="1"/>
+              <a:t>label</a:t>
+            </a:r>
+            <a:r>
+              <a:rPr lang="de-DE" sz="1200" dirty="0"/>
+              <a:t> </a:t>
+            </a:r>
+            <a:r>
+              <a:rPr lang="de-DE" sz="1200" dirty="0" err="1"/>
+              <a:t>identifying</a:t>
+            </a:r>
+            <a:r>
+              <a:rPr lang="de-DE" sz="1200" dirty="0"/>
+              <a:t> </a:t>
+            </a:r>
+            <a:r>
+              <a:rPr lang="de-DE" sz="1200" dirty="0" err="1"/>
+              <a:t>the</a:t>
+            </a:r>
+            <a:r>
+              <a:rPr lang="de-DE" sz="1200" dirty="0"/>
+              <a:t> HMC </a:t>
+            </a:r>
+            <a:r>
+              <a:rPr lang="de-DE" sz="1200" dirty="0" err="1"/>
+              <a:t>the</a:t>
+            </a:r>
+            <a:r>
+              <a:rPr lang="de-DE" sz="1200" dirty="0"/>
+              <a:t> </a:t>
+            </a:r>
+            <a:r>
+              <a:rPr lang="de-DE" sz="1200" dirty="0" err="1"/>
+              <a:t>logs</a:t>
+            </a:r>
+            <a:r>
+              <a:rPr lang="de-DE" sz="1200" dirty="0"/>
+              <a:t> </a:t>
+            </a:r>
+            <a:r>
+              <a:rPr lang="de-DE" sz="1200" dirty="0" err="1"/>
+              <a:t>came</a:t>
+            </a:r>
+            <a:r>
+              <a:rPr lang="de-DE" sz="1200" dirty="0"/>
+              <a:t> </a:t>
+            </a:r>
+            <a:r>
+              <a:rPr lang="de-DE" sz="1200" dirty="0" err="1"/>
+              <a:t>from</a:t>
+            </a:r>
+            <a:r>
+              <a:rPr lang="de-DE" sz="1200" dirty="0"/>
+              <a:t>.</a:t>
+            </a:r>
+            <a:br>
+              <a:rPr lang="de-DE" sz="1200" dirty="0"/>
+            </a:br>
+            <a:r>
+              <a:rPr lang="de-DE" sz="1200" dirty="0">
+                <a:latin typeface="Courier" pitchFamily="2" charset="0"/>
+              </a:rPr>
+              <a:t>type</a:t>
+            </a:r>
+            <a:r>
+              <a:rPr lang="de-DE" sz="1200" dirty="0"/>
+              <a:t>:   The log type: Security, Audit.</a:t>
+            </a:r>
+            <a:br>
+              <a:rPr lang="de-DE" sz="1200" dirty="0"/>
+            </a:br>
+            <a:r>
+              <a:rPr lang="de-DE" sz="1200" dirty="0" err="1">
+                <a:latin typeface="Courier" pitchFamily="2" charset="0"/>
+              </a:rPr>
+              <a:t>name</a:t>
+            </a:r>
+            <a:r>
+              <a:rPr lang="de-DE" sz="1200" dirty="0"/>
+              <a:t>:   The </a:t>
+            </a:r>
+            <a:r>
+              <a:rPr lang="de-DE" sz="1200" dirty="0" err="1"/>
               <a:t>name</a:t>
             </a:r>
             <a:r>
@@ -5578,7 +5992,7 @@
             </a:r>
             <a:r>
               <a:rPr lang="de-DE" sz="1200" dirty="0"/>
-              <a:t>: The ID </a:t>
+              <a:t>:       The ID </a:t>
             </a:r>
             <a:r>
               <a:rPr lang="de-DE" sz="1200" dirty="0" err="1"/>
@@ -5615,7 +6029,7 @@
             </a:r>
             <a:r>
               <a:rPr lang="de-DE" sz="1200" dirty="0"/>
-              <a:t>: The HMC </a:t>
+              <a:t>:   The HMC </a:t>
             </a:r>
             <a:r>
               <a:rPr lang="de-DE" sz="1200" dirty="0" err="1"/>
@@ -5671,7 +6085,7 @@
             </a:r>
             <a:r>
               <a:rPr lang="de-DE" sz="1200" dirty="0"/>
-              <a:t>: The </a:t>
+              <a:t>:     The </a:t>
             </a:r>
             <a:r>
               <a:rPr lang="de-DE" sz="1200" dirty="0" err="1"/>
@@ -5708,7 +6122,7 @@
             </a:r>
             <a:r>
               <a:rPr lang="de-DE" sz="1200" dirty="0"/>
-              <a:t>: The </a:t>
+              <a:t>:  The </a:t>
             </a:r>
             <a:r>
               <a:rPr lang="de-DE" sz="1200" dirty="0" err="1"/>
@@ -5752,7 +6166,7 @@
             </a:r>
             <a:r>
               <a:rPr lang="de-DE" sz="1200" dirty="0"/>
-              <a:t>: The </a:t>
+              <a:t>:   The </a:t>
             </a:r>
             <a:r>
               <a:rPr lang="de-DE" sz="1200" dirty="0" err="1"/>
@@ -5813,7 +6227,7 @@
             </a:r>
             <a:r>
               <a:rPr lang="de-DE" sz="1200" dirty="0"/>
-              <a:t>: The </a:t>
+              <a:t>:  The </a:t>
             </a:r>
             <a:r>
               <a:rPr lang="de-DE" sz="1200" dirty="0" err="1"/>
@@ -5996,12 +6410,35 @@
               <a:rPr lang="de-DE" sz="1000" dirty="0">
                 <a:latin typeface="Courier" pitchFamily="2" charset="0"/>
               </a:rPr>
-              <a:t> - a log </a:t>
+              <a:t> </a:t>
             </a:r>
             <a:r>
               <a:rPr lang="de-DE" sz="1000" dirty="0" err="1">
                 <a:latin typeface="Courier" pitchFamily="2" charset="0"/>
               </a:rPr>
+              <a:t>version</a:t>
+            </a:r>
+            <a:r>
+              <a:rPr lang="de-DE" sz="1000" dirty="0">
+                <a:latin typeface="Courier" pitchFamily="2" charset="0"/>
+              </a:rPr>
+              <a:t> 0.5.1.dev3</a:t>
+            </a:r>
+            <a:br>
+              <a:rPr lang="de-DE" sz="1000" dirty="0">
+                <a:latin typeface="Courier" pitchFamily="2" charset="0"/>
+              </a:rPr>
+            </a:br>
+            <a:r>
+              <a:rPr lang="de-DE" sz="1000" dirty="0">
+                <a:latin typeface="Courier" pitchFamily="2" charset="0"/>
+              </a:rPr>
+              <a:t>Log </a:t>
+            </a:r>
+            <a:r>
+              <a:rPr lang="de-DE" sz="1000" dirty="0" err="1">
+                <a:latin typeface="Courier" pitchFamily="2" charset="0"/>
+              </a:rPr>
               <a:t>forwarder</a:t>
             </a:r>
             <a:r>
@@ -6100,19 +6537,315 @@
               <a:rPr lang="de-DE" sz="1000" dirty="0">
                 <a:latin typeface="Courier" pitchFamily="2" charset="0"/>
               </a:rPr>
-              <a:t>Log </a:t>
+              <a:t>Label </a:t>
             </a:r>
             <a:r>
               <a:rPr lang="de-DE" sz="1000" dirty="0" err="1">
                 <a:latin typeface="Courier" pitchFamily="2" charset="0"/>
               </a:rPr>
+              <a:t>for</a:t>
+            </a:r>
+            <a:r>
+              <a:rPr lang="de-DE" sz="1000" dirty="0">
+                <a:latin typeface="Courier" pitchFamily="2" charset="0"/>
+              </a:rPr>
+              <a:t> </a:t>
+            </a:r>
+            <a:r>
+              <a:rPr lang="de-DE" sz="1000" dirty="0" err="1">
+                <a:latin typeface="Courier" pitchFamily="2" charset="0"/>
+              </a:rPr>
+              <a:t>this</a:t>
+            </a:r>
+            <a:r>
+              <a:rPr lang="de-DE" sz="1000" dirty="0">
+                <a:latin typeface="Courier" pitchFamily="2" charset="0"/>
+              </a:rPr>
+              <a:t> HMC:              wdc04-05_hmc1</a:t>
+            </a:r>
+            <a:br>
+              <a:rPr lang="de-DE" sz="1000" dirty="0">
+                <a:latin typeface="Courier" pitchFamily="2" charset="0"/>
+              </a:rPr>
+            </a:br>
+            <a:r>
+              <a:rPr lang="de-DE" sz="1000" dirty="0" err="1">
+                <a:latin typeface="Courier" pitchFamily="2" charset="0"/>
+              </a:rPr>
+              <a:t>Including</a:t>
+            </a:r>
+            <a:r>
+              <a:rPr lang="de-DE" sz="1000" dirty="0">
+                <a:latin typeface="Courier" pitchFamily="2" charset="0"/>
+              </a:rPr>
+              <a:t> </a:t>
+            </a:r>
+            <a:r>
+              <a:rPr lang="de-DE" sz="1000" dirty="0" err="1">
+                <a:latin typeface="Courier" pitchFamily="2" charset="0"/>
+              </a:rPr>
+              <a:t>these</a:t>
+            </a:r>
+            <a:r>
+              <a:rPr lang="de-DE" sz="1000" dirty="0">
+                <a:latin typeface="Courier" pitchFamily="2" charset="0"/>
+              </a:rPr>
+              <a:t> HMC </a:t>
+            </a:r>
+            <a:r>
+              <a:rPr lang="de-DE" sz="1000" dirty="0" err="1">
+                <a:latin typeface="Courier" pitchFamily="2" charset="0"/>
+              </a:rPr>
+              <a:t>logs</a:t>
+            </a:r>
+            <a:r>
+              <a:rPr lang="de-DE" sz="1000" dirty="0">
+                <a:latin typeface="Courier" pitchFamily="2" charset="0"/>
+              </a:rPr>
+              <a:t>:        </a:t>
+            </a:r>
+            <a:r>
+              <a:rPr lang="de-DE" sz="1000" dirty="0" err="1">
+                <a:latin typeface="Courier" pitchFamily="2" charset="0"/>
+              </a:rPr>
+              <a:t>security</a:t>
+            </a:r>
+            <a:r>
+              <a:rPr lang="de-DE" sz="1000" dirty="0">
+                <a:latin typeface="Courier" pitchFamily="2" charset="0"/>
+              </a:rPr>
+              <a:t>, </a:t>
+            </a:r>
+            <a:r>
+              <a:rPr lang="de-DE" sz="1000" dirty="0" err="1">
+                <a:latin typeface="Courier" pitchFamily="2" charset="0"/>
+              </a:rPr>
+              <a:t>audit</a:t>
+            </a:r>
+            <a:br>
+              <a:rPr lang="de-DE" sz="1000" dirty="0">
+                <a:latin typeface="Courier" pitchFamily="2" charset="0"/>
+              </a:rPr>
+            </a:br>
+            <a:r>
+              <a:rPr lang="de-DE" sz="1000" dirty="0" err="1">
+                <a:latin typeface="Courier" pitchFamily="2" charset="0"/>
+              </a:rPr>
+              <a:t>Including</a:t>
+            </a:r>
+            <a:r>
+              <a:rPr lang="de-DE" sz="1000" dirty="0">
+                <a:latin typeface="Courier" pitchFamily="2" charset="0"/>
+              </a:rPr>
+              <a:t> log </a:t>
+            </a:r>
+            <a:r>
+              <a:rPr lang="de-DE" sz="1000" dirty="0" err="1">
+                <a:latin typeface="Courier" pitchFamily="2" charset="0"/>
+              </a:rPr>
+              <a:t>entries</a:t>
+            </a:r>
+            <a:r>
+              <a:rPr lang="de-DE" sz="1000" dirty="0">
+                <a:latin typeface="Courier" pitchFamily="2" charset="0"/>
+              </a:rPr>
+              <a:t> </a:t>
+            </a:r>
+            <a:r>
+              <a:rPr lang="de-DE" sz="1000" dirty="0" err="1">
+                <a:latin typeface="Courier" pitchFamily="2" charset="0"/>
+              </a:rPr>
+              <a:t>since</a:t>
+            </a:r>
+            <a:r>
+              <a:rPr lang="de-DE" sz="1000" dirty="0">
+                <a:latin typeface="Courier" pitchFamily="2" charset="0"/>
+              </a:rPr>
+              <a:t>:     </a:t>
+            </a:r>
+            <a:r>
+              <a:rPr lang="de-DE" sz="1000" dirty="0" err="1">
+                <a:latin typeface="Courier" pitchFamily="2" charset="0"/>
+              </a:rPr>
+              <a:t>now</a:t>
+            </a:r>
+            <a:r>
+              <a:rPr lang="de-DE" sz="1000" dirty="0">
+                <a:latin typeface="Courier" pitchFamily="2" charset="0"/>
+              </a:rPr>
+              <a:t> (2019-08-08 17:13:10.161984+02:00)</a:t>
+            </a:r>
+            <a:br>
+              <a:rPr lang="de-DE" sz="1000" dirty="0">
+                <a:latin typeface="Courier" pitchFamily="2" charset="0"/>
+              </a:rPr>
+            </a:br>
+            <a:r>
+              <a:rPr lang="de-DE" sz="1000" dirty="0">
+                <a:latin typeface="Courier" pitchFamily="2" charset="0"/>
+              </a:rPr>
+              <a:t>Waiting </a:t>
+            </a:r>
+            <a:r>
+              <a:rPr lang="de-DE" sz="1000" dirty="0" err="1">
+                <a:latin typeface="Courier" pitchFamily="2" charset="0"/>
+              </a:rPr>
+              <a:t>for</a:t>
+            </a:r>
+            <a:r>
+              <a:rPr lang="de-DE" sz="1000" dirty="0">
+                <a:latin typeface="Courier" pitchFamily="2" charset="0"/>
+              </a:rPr>
+              <a:t> </a:t>
+            </a:r>
+            <a:r>
+              <a:rPr lang="de-DE" sz="1000" dirty="0" err="1">
+                <a:latin typeface="Courier" pitchFamily="2" charset="0"/>
+              </a:rPr>
+              <a:t>future</a:t>
+            </a:r>
+            <a:r>
+              <a:rPr lang="de-DE" sz="1000" dirty="0">
+                <a:latin typeface="Courier" pitchFamily="2" charset="0"/>
+              </a:rPr>
+              <a:t> log </a:t>
+            </a:r>
+            <a:r>
+              <a:rPr lang="de-DE" sz="1000" dirty="0" err="1">
+                <a:latin typeface="Courier" pitchFamily="2" charset="0"/>
+              </a:rPr>
+              <a:t>entries</a:t>
+            </a:r>
+            <a:r>
+              <a:rPr lang="de-DE" sz="1000" dirty="0">
+                <a:latin typeface="Courier" pitchFamily="2" charset="0"/>
+              </a:rPr>
+              <a:t>:  </a:t>
+            </a:r>
+            <a:r>
+              <a:rPr lang="de-DE" sz="1000" dirty="0" err="1">
+                <a:latin typeface="Courier" pitchFamily="2" charset="0"/>
+              </a:rPr>
+              <a:t>yes</a:t>
+            </a:r>
+            <a:r>
+              <a:rPr lang="de-DE" sz="1000" dirty="0">
+                <a:latin typeface="Courier" pitchFamily="2" charset="0"/>
+              </a:rPr>
+              <a:t> (</a:t>
+            </a:r>
+            <a:r>
+              <a:rPr lang="de-DE" sz="1000" dirty="0" err="1">
+                <a:latin typeface="Courier" pitchFamily="2" charset="0"/>
+              </a:rPr>
+              <a:t>use</a:t>
+            </a:r>
+            <a:r>
+              <a:rPr lang="de-DE" sz="1000" dirty="0">
+                <a:latin typeface="Courier" pitchFamily="2" charset="0"/>
+              </a:rPr>
+              <a:t> </a:t>
+            </a:r>
+            <a:r>
+              <a:rPr lang="de-DE" sz="1000" dirty="0" err="1">
+                <a:latin typeface="Courier" pitchFamily="2" charset="0"/>
+              </a:rPr>
+              <a:t>keyboard</a:t>
+            </a:r>
+            <a:r>
+              <a:rPr lang="de-DE" sz="1000" dirty="0">
+                <a:latin typeface="Courier" pitchFamily="2" charset="0"/>
+              </a:rPr>
+              <a:t> </a:t>
+            </a:r>
+            <a:r>
+              <a:rPr lang="de-DE" sz="1000" dirty="0" err="1">
+                <a:latin typeface="Courier" pitchFamily="2" charset="0"/>
+              </a:rPr>
+              <a:t>interrupt</a:t>
+            </a:r>
+            <a:r>
+              <a:rPr lang="de-DE" sz="1000" dirty="0">
+                <a:latin typeface="Courier" pitchFamily="2" charset="0"/>
+              </a:rPr>
+              <a:t> </a:t>
+            </a:r>
+            <a:r>
+              <a:rPr lang="de-DE" sz="1000" dirty="0" err="1">
+                <a:latin typeface="Courier" pitchFamily="2" charset="0"/>
+              </a:rPr>
+              <a:t>to</a:t>
+            </a:r>
+            <a:r>
+              <a:rPr lang="de-DE" sz="1000" dirty="0">
+                <a:latin typeface="Courier" pitchFamily="2" charset="0"/>
+              </a:rPr>
+              <a:t> </a:t>
+            </a:r>
+            <a:r>
+              <a:rPr lang="de-DE" sz="1000" dirty="0" err="1">
+                <a:latin typeface="Courier" pitchFamily="2" charset="0"/>
+              </a:rPr>
+              <a:t>stop</a:t>
+            </a:r>
+            <a:r>
+              <a:rPr lang="de-DE" sz="1000" dirty="0">
+                <a:latin typeface="Courier" pitchFamily="2" charset="0"/>
+              </a:rPr>
+              <a:t>, e.g. </a:t>
+            </a:r>
+            <a:r>
+              <a:rPr lang="de-DE" sz="1000" dirty="0" err="1">
+                <a:latin typeface="Courier" pitchFamily="2" charset="0"/>
+              </a:rPr>
+              <a:t>Ctrl</a:t>
+            </a:r>
+            <a:r>
+              <a:rPr lang="de-DE" sz="1000" dirty="0">
+                <a:latin typeface="Courier" pitchFamily="2" charset="0"/>
+              </a:rPr>
+              <a:t>-C)</a:t>
+            </a:r>
+            <a:br>
+              <a:rPr lang="de-DE" sz="1000" dirty="0">
+                <a:latin typeface="Courier" pitchFamily="2" charset="0"/>
+              </a:rPr>
+            </a:br>
+            <a:r>
+              <a:rPr lang="de-DE" sz="1000" dirty="0" err="1">
+                <a:latin typeface="Courier" pitchFamily="2" charset="0"/>
+              </a:rPr>
+              <a:t>Forwarding</a:t>
+            </a:r>
+            <a:r>
+              <a:rPr lang="de-DE" sz="1000" dirty="0">
+                <a:latin typeface="Courier" pitchFamily="2" charset="0"/>
+              </a:rPr>
+              <a:t> </a:t>
+            </a:r>
+            <a:r>
+              <a:rPr lang="de-DE" sz="1000" dirty="0" err="1">
+                <a:latin typeface="Courier" pitchFamily="2" charset="0"/>
+              </a:rPr>
+              <a:t>to</a:t>
+            </a:r>
+            <a:r>
+              <a:rPr lang="de-DE" sz="1000" dirty="0">
+                <a:latin typeface="Courier" pitchFamily="2" charset="0"/>
+              </a:rPr>
+              <a:t> </a:t>
+            </a:r>
+            <a:r>
+              <a:rPr lang="de-DE" sz="1000" dirty="0" err="1">
+                <a:latin typeface="Courier" pitchFamily="2" charset="0"/>
+              </a:rPr>
               <a:t>destination</a:t>
             </a:r>
             <a:r>
               <a:rPr lang="de-DE" sz="1000" dirty="0">
                 <a:latin typeface="Courier" pitchFamily="2" charset="0"/>
               </a:rPr>
-              <a:t>:                 </a:t>
+              <a:t>:       </a:t>
             </a:r>
             <a:r>
               <a:rPr lang="de-DE" sz="1000" dirty="0" err="1">
@@ -6125,70 +6858,193 @@
                 <a:latin typeface="Courier" pitchFamily="2" charset="0"/>
               </a:rPr>
             </a:br>
+            <a:br>
+              <a:rPr lang="de-DE" sz="1000" dirty="0">
+                <a:latin typeface="Courier" pitchFamily="2" charset="0"/>
+              </a:rPr>
+            </a:br>
+            <a:r>
+              <a:rPr lang="de-DE" sz="1000" dirty="0">
+                <a:latin typeface="Courier" pitchFamily="2" charset="0"/>
+              </a:rPr>
+              <a:t>Time                              Type      Name         ID  </a:t>
+            </a:r>
             <a:r>
               <a:rPr lang="de-DE" sz="1000" dirty="0" err="1">
                 <a:latin typeface="Courier" pitchFamily="2" charset="0"/>
               </a:rPr>
-              <a:t>Gathering</a:t>
-            </a:r>
-            <a:r>
-              <a:rPr lang="de-DE" sz="1000" dirty="0">
-                <a:latin typeface="Courier" pitchFamily="2" charset="0"/>
-              </a:rPr>
-              <a:t> </a:t>
+              <a:t>Userid</a:t>
+            </a:r>
+            <a:r>
+              <a:rPr lang="de-DE" sz="1000" dirty="0">
+                <a:latin typeface="Courier" pitchFamily="2" charset="0"/>
+              </a:rPr>
+              <a:t>      Message</a:t>
+            </a:r>
+            <a:br>
+              <a:rPr lang="de-DE" sz="1000" dirty="0">
+                <a:latin typeface="Courier" pitchFamily="2" charset="0"/>
+              </a:rPr>
+            </a:br>
+            <a:r>
+              <a:rPr lang="de-DE" sz="1000" dirty="0">
+                <a:latin typeface="Courier" pitchFamily="2" charset="0"/>
+              </a:rPr>
+              <a:t>-----------------------------------------------------------------------------------------------------------------…</a:t>
+            </a:r>
+            <a:br>
+              <a:rPr lang="de-DE" sz="1000" dirty="0">
+                <a:latin typeface="Courier" pitchFamily="2" charset="0"/>
+              </a:rPr>
+            </a:br>
+            <a:r>
+              <a:rPr lang="de-DE" sz="1000" dirty="0">
+                <a:latin typeface="Courier" pitchFamily="2" charset="0"/>
+              </a:rPr>
+              <a:t>2019-08-08 17:13:21.060000+02:00  Security  WSA </a:t>
             </a:r>
             <a:r>
               <a:rPr lang="de-DE" sz="1000" dirty="0" err="1">
                 <a:latin typeface="Courier" pitchFamily="2" charset="0"/>
               </a:rPr>
-              <a:t>these</a:t>
-            </a:r>
-            <a:r>
-              <a:rPr lang="de-DE" sz="1000" dirty="0">
-                <a:latin typeface="Courier" pitchFamily="2" charset="0"/>
-              </a:rPr>
-              <a:t> HMC </a:t>
+              <a:t>Logon</a:t>
+            </a:r>
+            <a:r>
+              <a:rPr lang="de-DE" sz="1000" dirty="0">
+                <a:latin typeface="Courier" pitchFamily="2" charset="0"/>
+              </a:rPr>
+              <a:t>  1941  </a:t>
             </a:r>
             <a:r>
               <a:rPr lang="de-DE" sz="1000" dirty="0" err="1">
                 <a:latin typeface="Courier" pitchFamily="2" charset="0"/>
               </a:rPr>
-              <a:t>logs</a:t>
-            </a:r>
-            <a:r>
-              <a:rPr lang="de-DE" sz="1000" dirty="0">
-                <a:latin typeface="Courier" pitchFamily="2" charset="0"/>
-              </a:rPr>
-              <a:t>:        </a:t>
+              <a:t>zbcInstall</a:t>
+            </a:r>
+            <a:r>
+              <a:rPr lang="de-DE" sz="1000" dirty="0">
+                <a:latin typeface="Courier" pitchFamily="2" charset="0"/>
+              </a:rPr>
+              <a:t>  User </a:t>
             </a:r>
             <a:r>
               <a:rPr lang="de-DE" sz="1000" dirty="0" err="1">
                 <a:latin typeface="Courier" pitchFamily="2" charset="0"/>
               </a:rPr>
-              <a:t>security</a:t>
-            </a:r>
-            <a:r>
-              <a:rPr lang="de-DE" sz="1000" dirty="0">
-                <a:latin typeface="Courier" pitchFamily="2" charset="0"/>
-              </a:rPr>
-              <a:t>, </a:t>
+              <a:t>zbcInstall</a:t>
+            </a:r>
+            <a:r>
+              <a:rPr lang="de-DE" sz="1000" dirty="0">
+                <a:latin typeface="Courier" pitchFamily="2" charset="0"/>
+              </a:rPr>
+              <a:t> </a:t>
             </a:r>
             <a:r>
               <a:rPr lang="de-DE" sz="1000" dirty="0" err="1">
                 <a:latin typeface="Courier" pitchFamily="2" charset="0"/>
               </a:rPr>
-              <a:t>audit</a:t>
-            </a:r>
-            <a:br>
-              <a:rPr lang="de-DE" sz="1000" dirty="0">
-                <a:latin typeface="Courier" pitchFamily="2" charset="0"/>
-              </a:rPr>
-            </a:br>
+              <a:t>has</a:t>
+            </a:r>
+            <a:r>
+              <a:rPr lang="de-DE" sz="1000" dirty="0">
+                <a:latin typeface="Courier" pitchFamily="2" charset="0"/>
+              </a:rPr>
+              <a:t> </a:t>
+            </a:r>
             <a:r>
               <a:rPr lang="de-DE" sz="1000" dirty="0" err="1">
                 <a:latin typeface="Courier" pitchFamily="2" charset="0"/>
               </a:rPr>
-              <a:t>Include</a:t>
+              <a:t>logged</a:t>
+            </a:r>
+            <a:r>
+              <a:rPr lang="de-DE" sz="1000" dirty="0">
+                <a:latin typeface="Courier" pitchFamily="2" charset="0"/>
+              </a:rPr>
+              <a:t> on </a:t>
+            </a:r>
+            <a:r>
+              <a:rPr lang="de-DE" sz="1000" dirty="0" err="1">
+                <a:latin typeface="Courier" pitchFamily="2" charset="0"/>
+              </a:rPr>
+              <a:t>to</a:t>
+            </a:r>
+            <a:r>
+              <a:rPr lang="de-DE" sz="1000" dirty="0">
+                <a:latin typeface="Courier" pitchFamily="2" charset="0"/>
+              </a:rPr>
+              <a:t> Web </a:t>
+            </a:r>
+            <a:r>
+              <a:rPr lang="de-DE" sz="1000" dirty="0" err="1">
+                <a:latin typeface="Courier" pitchFamily="2" charset="0"/>
+              </a:rPr>
+              <a:t>Ser</a:t>
+            </a:r>
+            <a:r>
+              <a:rPr lang="de-DE" sz="1000" dirty="0">
+                <a:latin typeface="Courier" pitchFamily="2" charset="0"/>
+              </a:rPr>
+              <a:t>…</a:t>
+            </a:r>
+            <a:br>
+              <a:rPr lang="de-DE" sz="1000" dirty="0">
+                <a:latin typeface="Courier" pitchFamily="2" charset="0"/>
+              </a:rPr>
+            </a:br>
+            <a:r>
+              <a:rPr lang="de-DE" sz="1000" dirty="0" err="1">
+                <a:latin typeface="Courier" pitchFamily="2" charset="0"/>
+              </a:rPr>
+              <a:t>Starting</a:t>
+            </a:r>
+            <a:r>
+              <a:rPr lang="de-DE" sz="1000" dirty="0">
+                <a:latin typeface="Courier" pitchFamily="2" charset="0"/>
+              </a:rPr>
+              <a:t> </a:t>
+            </a:r>
+            <a:r>
+              <a:rPr lang="de-DE" sz="1000" dirty="0" err="1">
+                <a:latin typeface="Courier" pitchFamily="2" charset="0"/>
+              </a:rPr>
+              <a:t>to</a:t>
+            </a:r>
+            <a:r>
+              <a:rPr lang="de-DE" sz="1000" dirty="0">
+                <a:latin typeface="Courier" pitchFamily="2" charset="0"/>
+              </a:rPr>
+              <a:t> </a:t>
+            </a:r>
+            <a:r>
+              <a:rPr lang="de-DE" sz="1000" dirty="0" err="1">
+                <a:latin typeface="Courier" pitchFamily="2" charset="0"/>
+              </a:rPr>
+              <a:t>wait</a:t>
+            </a:r>
+            <a:r>
+              <a:rPr lang="de-DE" sz="1000" dirty="0">
+                <a:latin typeface="Courier" pitchFamily="2" charset="0"/>
+              </a:rPr>
+              <a:t> </a:t>
+            </a:r>
+            <a:r>
+              <a:rPr lang="de-DE" sz="1000" dirty="0" err="1">
+                <a:latin typeface="Courier" pitchFamily="2" charset="0"/>
+              </a:rPr>
+              <a:t>for</a:t>
+            </a:r>
+            <a:r>
+              <a:rPr lang="de-DE" sz="1000" dirty="0">
+                <a:latin typeface="Courier" pitchFamily="2" charset="0"/>
+              </a:rPr>
+              <a:t> </a:t>
+            </a:r>
+            <a:r>
+              <a:rPr lang="de-DE" sz="1000" dirty="0" err="1">
+                <a:latin typeface="Courier" pitchFamily="2" charset="0"/>
+              </a:rPr>
+              <a:t>future</a:t>
             </a:r>
             <a:r>
               <a:rPr lang="de-DE" sz="1000" dirty="0">
@@ -6202,46 +7058,57 @@
               </a:rPr>
               <a:t>entries</a:t>
             </a:r>
-            <a:r>
-              <a:rPr lang="de-DE" sz="1000" dirty="0">
-                <a:latin typeface="Courier" pitchFamily="2" charset="0"/>
-              </a:rPr>
-              <a:t> </a:t>
+            <a:br>
+              <a:rPr lang="de-DE" sz="1000" dirty="0">
+                <a:latin typeface="Courier" pitchFamily="2" charset="0"/>
+              </a:rPr>
+            </a:br>
+            <a:r>
+              <a:rPr lang="de-DE" sz="1000" dirty="0">
+                <a:latin typeface="Courier" pitchFamily="2" charset="0"/>
+              </a:rPr>
+              <a:t>2019-08-08 17:14:05.590000+02:00  Audit     WSAPI      6055              A web </a:t>
             </a:r>
             <a:r>
               <a:rPr lang="de-DE" sz="1000" dirty="0" err="1">
                 <a:latin typeface="Courier" pitchFamily="2" charset="0"/>
               </a:rPr>
-              <a:t>since</a:t>
-            </a:r>
-            <a:r>
-              <a:rPr lang="de-DE" sz="1000" dirty="0">
-                <a:latin typeface="Courier" pitchFamily="2" charset="0"/>
-              </a:rPr>
-              <a:t>:       </a:t>
+              <a:t>services</a:t>
+            </a:r>
+            <a:r>
+              <a:rPr lang="de-DE" sz="1000" dirty="0">
+                <a:latin typeface="Courier" pitchFamily="2" charset="0"/>
+              </a:rPr>
+              <a:t> </a:t>
             </a:r>
             <a:r>
               <a:rPr lang="de-DE" sz="1000" dirty="0" err="1">
                 <a:latin typeface="Courier" pitchFamily="2" charset="0"/>
               </a:rPr>
-              <a:t>now</a:t>
-            </a:r>
-            <a:r>
-              <a:rPr lang="de-DE" sz="1000" dirty="0">
-                <a:latin typeface="Courier" pitchFamily="2" charset="0"/>
-              </a:rPr>
-              <a:t> (2019-08-08 08:52:05.399237+02:00)</a:t>
-            </a:r>
-            <a:br>
-              <a:rPr lang="de-DE" sz="1000" dirty="0">
-                <a:latin typeface="Courier" pitchFamily="2" charset="0"/>
-              </a:rPr>
-            </a:br>
+              <a:t>client</a:t>
+            </a:r>
+            <a:r>
+              <a:rPr lang="de-DE" sz="1000" dirty="0">
+                <a:latin typeface="Courier" pitchFamily="2" charset="0"/>
+              </a:rPr>
+              <a:t> on 10.183.204.141 …</a:t>
+            </a:r>
+            <a:br>
+              <a:rPr lang="de-DE" sz="1000" dirty="0">
+                <a:latin typeface="Courier" pitchFamily="2" charset="0"/>
+              </a:rPr>
+            </a:br>
+            <a:r>
+              <a:rPr lang="de-DE" sz="1000" dirty="0">
+                <a:latin typeface="Courier" pitchFamily="2" charset="0"/>
+              </a:rPr>
+              <a:t>2019-08-08 17:15:45+02:00         Audit     RSFERROR    151              A remote </a:t>
+            </a:r>
             <a:r>
               <a:rPr lang="de-DE" sz="1000" dirty="0" err="1">
                 <a:latin typeface="Courier" pitchFamily="2" charset="0"/>
               </a:rPr>
-              <a:t>Wait</a:t>
+              <a:t>connection</a:t>
             </a:r>
             <a:r>
               <a:rPr lang="de-DE" sz="1000" dirty="0">
@@ -6253,6 +7120,307 @@
               <a:rPr lang="de-DE" sz="1000" dirty="0" err="1">
                 <a:latin typeface="Courier" pitchFamily="2" charset="0"/>
               </a:rPr>
+              <a:t>failed</a:t>
+            </a:r>
+            <a:r>
+              <a:rPr lang="de-DE" sz="1000" dirty="0">
+                <a:latin typeface="Courier" pitchFamily="2" charset="0"/>
+              </a:rPr>
+              <a:t>.</a:t>
+            </a:r>
+            <a:br>
+              <a:rPr lang="de-DE" sz="1000" dirty="0">
+                <a:latin typeface="Courier" pitchFamily="2" charset="0"/>
+              </a:rPr>
+            </a:br>
+            <a:r>
+              <a:rPr lang="de-DE" sz="1000" dirty="0">
+                <a:latin typeface="Courier" pitchFamily="2" charset="0"/>
+              </a:rPr>
+              <a:t>2019-08-08 17:15:46.270000+02:00  Audit     TRSF_FAIL   678              Remote </a:t>
+            </a:r>
+            <a:r>
+              <a:rPr lang="de-DE" sz="1000" dirty="0" err="1">
+                <a:latin typeface="Courier" pitchFamily="2" charset="0"/>
+              </a:rPr>
+              <a:t>support</a:t>
+            </a:r>
+            <a:r>
+              <a:rPr lang="de-DE" sz="1000" dirty="0">
+                <a:latin typeface="Courier" pitchFamily="2" charset="0"/>
+              </a:rPr>
+              <a:t> </a:t>
+            </a:r>
+            <a:r>
+              <a:rPr lang="de-DE" sz="1000" dirty="0" err="1">
+                <a:latin typeface="Courier" pitchFamily="2" charset="0"/>
+              </a:rPr>
+              <a:t>call</a:t>
+            </a:r>
+            <a:r>
+              <a:rPr lang="de-DE" sz="1000" dirty="0">
+                <a:latin typeface="Courier" pitchFamily="2" charset="0"/>
+              </a:rPr>
+              <a:t> </a:t>
+            </a:r>
+            <a:r>
+              <a:rPr lang="de-DE" sz="1000" dirty="0" err="1">
+                <a:latin typeface="Courier" pitchFamily="2" charset="0"/>
+              </a:rPr>
+              <a:t>generated</a:t>
+            </a:r>
+            <a:r>
+              <a:rPr lang="de-DE" sz="1000" dirty="0">
+                <a:latin typeface="Courier" pitchFamily="2" charset="0"/>
+              </a:rPr>
+              <a:t> on HMC1 </a:t>
+            </a:r>
+            <a:r>
+              <a:rPr lang="de-DE" sz="1000" dirty="0" err="1">
+                <a:latin typeface="Courier" pitchFamily="2" charset="0"/>
+              </a:rPr>
+              <a:t>fa</a:t>
+            </a:r>
+            <a:r>
+              <a:rPr lang="de-DE" sz="1000" dirty="0">
+                <a:latin typeface="Courier" pitchFamily="2" charset="0"/>
+              </a:rPr>
+              <a:t>…</a:t>
+            </a:r>
+            <a:br>
+              <a:rPr lang="de-DE" sz="1000" dirty="0">
+                <a:latin typeface="Courier" pitchFamily="2" charset="0"/>
+              </a:rPr>
+            </a:br>
+            <a:r>
+              <a:rPr lang="de-DE" sz="1000" dirty="0">
+                <a:latin typeface="Courier" pitchFamily="2" charset="0"/>
+              </a:rPr>
+              <a:t>2019-08-08 17:15:56.550000+02:00  Security  WSA </a:t>
+            </a:r>
+            <a:r>
+              <a:rPr lang="de-DE" sz="1000" dirty="0" err="1">
+                <a:latin typeface="Courier" pitchFamily="2" charset="0"/>
+              </a:rPr>
+              <a:t>Logon</a:t>
+            </a:r>
+            <a:r>
+              <a:rPr lang="de-DE" sz="1000" dirty="0">
+                <a:latin typeface="Courier" pitchFamily="2" charset="0"/>
+              </a:rPr>
+              <a:t>  1941  </a:t>
+            </a:r>
+            <a:r>
+              <a:rPr lang="de-DE" sz="1000" dirty="0" err="1">
+                <a:latin typeface="Courier" pitchFamily="2" charset="0"/>
+              </a:rPr>
+              <a:t>zbcInstall</a:t>
+            </a:r>
+            <a:r>
+              <a:rPr lang="de-DE" sz="1000" dirty="0">
+                <a:latin typeface="Courier" pitchFamily="2" charset="0"/>
+              </a:rPr>
+              <a:t>  User </a:t>
+            </a:r>
+            <a:r>
+              <a:rPr lang="de-DE" sz="1000" dirty="0" err="1">
+                <a:latin typeface="Courier" pitchFamily="2" charset="0"/>
+              </a:rPr>
+              <a:t>zbcInstall</a:t>
+            </a:r>
+            <a:r>
+              <a:rPr lang="de-DE" sz="1000" dirty="0">
+                <a:latin typeface="Courier" pitchFamily="2" charset="0"/>
+              </a:rPr>
+              <a:t> </a:t>
+            </a:r>
+            <a:r>
+              <a:rPr lang="de-DE" sz="1000" dirty="0" err="1">
+                <a:latin typeface="Courier" pitchFamily="2" charset="0"/>
+              </a:rPr>
+              <a:t>has</a:t>
+            </a:r>
+            <a:r>
+              <a:rPr lang="de-DE" sz="1000" dirty="0">
+                <a:latin typeface="Courier" pitchFamily="2" charset="0"/>
+              </a:rPr>
+              <a:t> </a:t>
+            </a:r>
+            <a:r>
+              <a:rPr lang="de-DE" sz="1000" dirty="0" err="1">
+                <a:latin typeface="Courier" pitchFamily="2" charset="0"/>
+              </a:rPr>
+              <a:t>logged</a:t>
+            </a:r>
+            <a:r>
+              <a:rPr lang="de-DE" sz="1000" dirty="0">
+                <a:latin typeface="Courier" pitchFamily="2" charset="0"/>
+              </a:rPr>
+              <a:t> on </a:t>
+            </a:r>
+            <a:r>
+              <a:rPr lang="de-DE" sz="1000" dirty="0" err="1">
+                <a:latin typeface="Courier" pitchFamily="2" charset="0"/>
+              </a:rPr>
+              <a:t>to</a:t>
+            </a:r>
+            <a:r>
+              <a:rPr lang="de-DE" sz="1000" dirty="0">
+                <a:latin typeface="Courier" pitchFamily="2" charset="0"/>
+              </a:rPr>
+              <a:t> Web </a:t>
+            </a:r>
+            <a:r>
+              <a:rPr lang="de-DE" sz="1000" dirty="0" err="1">
+                <a:latin typeface="Courier" pitchFamily="2" charset="0"/>
+              </a:rPr>
+              <a:t>Ser</a:t>
+            </a:r>
+            <a:r>
+              <a:rPr lang="de-DE" sz="1000" dirty="0">
+                <a:latin typeface="Courier" pitchFamily="2" charset="0"/>
+              </a:rPr>
+              <a:t>…</a:t>
+            </a:r>
+            <a:br>
+              <a:rPr lang="de-DE" sz="1000" dirty="0">
+                <a:latin typeface="Courier" pitchFamily="2" charset="0"/>
+              </a:rPr>
+            </a:br>
+            <a:r>
+              <a:rPr lang="de-DE" sz="1000" dirty="0">
+                <a:latin typeface="Courier" pitchFamily="2" charset="0"/>
+              </a:rPr>
+              <a:t>2019-08-08 17:15:56.840000+02:00  Security  WSA </a:t>
+            </a:r>
+            <a:r>
+              <a:rPr lang="de-DE" sz="1000" dirty="0" err="1">
+                <a:latin typeface="Courier" pitchFamily="2" charset="0"/>
+              </a:rPr>
+              <a:t>Logoff</a:t>
+            </a:r>
+            <a:r>
+              <a:rPr lang="de-DE" sz="1000" dirty="0">
+                <a:latin typeface="Courier" pitchFamily="2" charset="0"/>
+              </a:rPr>
+              <a:t> 1942  </a:t>
+            </a:r>
+            <a:r>
+              <a:rPr lang="de-DE" sz="1000" dirty="0" err="1">
+                <a:latin typeface="Courier" pitchFamily="2" charset="0"/>
+              </a:rPr>
+              <a:t>zbcInstall</a:t>
+            </a:r>
+            <a:r>
+              <a:rPr lang="de-DE" sz="1000" dirty="0">
+                <a:latin typeface="Courier" pitchFamily="2" charset="0"/>
+              </a:rPr>
+              <a:t>  User </a:t>
+            </a:r>
+            <a:r>
+              <a:rPr lang="de-DE" sz="1000" dirty="0" err="1">
+                <a:latin typeface="Courier" pitchFamily="2" charset="0"/>
+              </a:rPr>
+              <a:t>zbcInstall</a:t>
+            </a:r>
+            <a:r>
+              <a:rPr lang="de-DE" sz="1000" dirty="0">
+                <a:latin typeface="Courier" pitchFamily="2" charset="0"/>
+              </a:rPr>
+              <a:t> </a:t>
+            </a:r>
+            <a:r>
+              <a:rPr lang="de-DE" sz="1000" dirty="0" err="1">
+                <a:latin typeface="Courier" pitchFamily="2" charset="0"/>
+              </a:rPr>
+              <a:t>has</a:t>
+            </a:r>
+            <a:r>
+              <a:rPr lang="de-DE" sz="1000" dirty="0">
+                <a:latin typeface="Courier" pitchFamily="2" charset="0"/>
+              </a:rPr>
+              <a:t> </a:t>
+            </a:r>
+            <a:r>
+              <a:rPr lang="de-DE" sz="1000" dirty="0" err="1">
+                <a:latin typeface="Courier" pitchFamily="2" charset="0"/>
+              </a:rPr>
+              <a:t>logged</a:t>
+            </a:r>
+            <a:r>
+              <a:rPr lang="de-DE" sz="1000" dirty="0">
+                <a:latin typeface="Courier" pitchFamily="2" charset="0"/>
+              </a:rPr>
+              <a:t> off </a:t>
+            </a:r>
+            <a:r>
+              <a:rPr lang="de-DE" sz="1000" dirty="0" err="1">
+                <a:latin typeface="Courier" pitchFamily="2" charset="0"/>
+              </a:rPr>
+              <a:t>from</a:t>
+            </a:r>
+            <a:r>
+              <a:rPr lang="de-DE" sz="1000" dirty="0">
+                <a:latin typeface="Courier" pitchFamily="2" charset="0"/>
+              </a:rPr>
+              <a:t> Web …</a:t>
+            </a:r>
+            <a:br>
+              <a:rPr lang="de-DE" sz="1000" dirty="0">
+                <a:latin typeface="Courier" pitchFamily="2" charset="0"/>
+              </a:rPr>
+            </a:br>
+            <a:r>
+              <a:rPr lang="de-DE" sz="1000" dirty="0">
+                <a:latin typeface="Courier" pitchFamily="2" charset="0"/>
+              </a:rPr>
+              <a:t>^C---------------------------------------------------------------------------------------------------------------…</a:t>
+            </a:r>
+            <a:br>
+              <a:rPr lang="de-DE" sz="1000" dirty="0">
+                <a:latin typeface="Courier" pitchFamily="2" charset="0"/>
+              </a:rPr>
+            </a:br>
+            <a:r>
+              <a:rPr lang="de-DE" sz="1000" dirty="0" err="1">
+                <a:latin typeface="Courier" pitchFamily="2" charset="0"/>
+              </a:rPr>
+              <a:t>Stopping</a:t>
+            </a:r>
+            <a:r>
+              <a:rPr lang="de-DE" sz="1000" dirty="0">
+                <a:latin typeface="Courier" pitchFamily="2" charset="0"/>
+              </a:rPr>
+              <a:t> </a:t>
+            </a:r>
+            <a:r>
+              <a:rPr lang="de-DE" sz="1000" dirty="0" err="1">
+                <a:latin typeface="Courier" pitchFamily="2" charset="0"/>
+              </a:rPr>
+              <a:t>to</a:t>
+            </a:r>
+            <a:r>
+              <a:rPr lang="de-DE" sz="1000" dirty="0">
+                <a:latin typeface="Courier" pitchFamily="2" charset="0"/>
+              </a:rPr>
+              <a:t> </a:t>
+            </a:r>
+            <a:r>
+              <a:rPr lang="de-DE" sz="1000" dirty="0" err="1">
+                <a:latin typeface="Courier" pitchFamily="2" charset="0"/>
+              </a:rPr>
+              <a:t>wait</a:t>
+            </a:r>
+            <a:r>
+              <a:rPr lang="de-DE" sz="1000" dirty="0">
+                <a:latin typeface="Courier" pitchFamily="2" charset="0"/>
+              </a:rPr>
+              <a:t> </a:t>
+            </a:r>
+            <a:r>
+              <a:rPr lang="de-DE" sz="1000" dirty="0" err="1">
+                <a:latin typeface="Courier" pitchFamily="2" charset="0"/>
+              </a:rPr>
               <a:t>for</a:t>
             </a:r>
             <a:r>
@@ -6279,29 +7447,28 @@
               </a:rPr>
               <a:t>entries</a:t>
             </a:r>
-            <a:r>
-              <a:rPr lang="de-DE" sz="1000" dirty="0">
-                <a:latin typeface="Courier" pitchFamily="2" charset="0"/>
-              </a:rPr>
-              <a:t>:     </a:t>
-            </a:r>
+            <a:br>
+              <a:rPr lang="de-DE" sz="1000" dirty="0">
+                <a:latin typeface="Courier" pitchFamily="2" charset="0"/>
+              </a:rPr>
+            </a:br>
             <a:r>
               <a:rPr lang="de-DE" sz="1000" dirty="0" err="1">
                 <a:latin typeface="Courier" pitchFamily="2" charset="0"/>
               </a:rPr>
-              <a:t>yes</a:t>
-            </a:r>
-            <a:r>
-              <a:rPr lang="de-DE" sz="1000" dirty="0">
-                <a:latin typeface="Courier" pitchFamily="2" charset="0"/>
-              </a:rPr>
-              <a:t> (</a:t>
+              <a:t>Closing</a:t>
+            </a:r>
+            <a:r>
+              <a:rPr lang="de-DE" sz="1000" dirty="0">
+                <a:latin typeface="Courier" pitchFamily="2" charset="0"/>
+              </a:rPr>
+              <a:t> </a:t>
             </a:r>
             <a:r>
               <a:rPr lang="de-DE" sz="1000" dirty="0" err="1">
                 <a:latin typeface="Courier" pitchFamily="2" charset="0"/>
               </a:rPr>
-              <a:t>use</a:t>
+              <a:t>notification</a:t>
             </a:r>
             <a:r>
               <a:rPr lang="de-DE" sz="1000" dirty="0">
@@ -6313,463 +7480,17 @@
               <a:rPr lang="de-DE" sz="1000" dirty="0" err="1">
                 <a:latin typeface="Courier" pitchFamily="2" charset="0"/>
               </a:rPr>
-              <a:t>keyboard</a:t>
-            </a:r>
-            <a:r>
-              <a:rPr lang="de-DE" sz="1000" dirty="0">
-                <a:latin typeface="Courier" pitchFamily="2" charset="0"/>
-              </a:rPr>
-              <a:t> </a:t>
-            </a:r>
+              <a:t>receiver</a:t>
+            </a:r>
+            <a:br>
+              <a:rPr lang="de-DE" sz="1000" dirty="0">
+                <a:latin typeface="Courier" pitchFamily="2" charset="0"/>
+              </a:rPr>
+            </a:br>
             <a:r>
               <a:rPr lang="de-DE" sz="1000" dirty="0" err="1">
                 <a:latin typeface="Courier" pitchFamily="2" charset="0"/>
               </a:rPr>
-              <a:t>interrupt</a:t>
-            </a:r>
-            <a:r>
-              <a:rPr lang="de-DE" sz="1000" dirty="0">
-                <a:latin typeface="Courier" pitchFamily="2" charset="0"/>
-              </a:rPr>
-              <a:t> </a:t>
-            </a:r>
-            <a:r>
-              <a:rPr lang="de-DE" sz="1000" dirty="0" err="1">
-                <a:latin typeface="Courier" pitchFamily="2" charset="0"/>
-              </a:rPr>
-              <a:t>to</a:t>
-            </a:r>
-            <a:r>
-              <a:rPr lang="de-DE" sz="1000" dirty="0">
-                <a:latin typeface="Courier" pitchFamily="2" charset="0"/>
-              </a:rPr>
-              <a:t> </a:t>
-            </a:r>
-            <a:r>
-              <a:rPr lang="de-DE" sz="1000" dirty="0" err="1">
-                <a:latin typeface="Courier" pitchFamily="2" charset="0"/>
-              </a:rPr>
-              <a:t>stop</a:t>
-            </a:r>
-            <a:r>
-              <a:rPr lang="de-DE" sz="1000" dirty="0">
-                <a:latin typeface="Courier" pitchFamily="2" charset="0"/>
-              </a:rPr>
-              <a:t>, e.g. </a:t>
-            </a:r>
-            <a:r>
-              <a:rPr lang="de-DE" sz="1000" dirty="0" err="1">
-                <a:latin typeface="Courier" pitchFamily="2" charset="0"/>
-              </a:rPr>
-              <a:t>Ctrl</a:t>
-            </a:r>
-            <a:r>
-              <a:rPr lang="de-DE" sz="1000" dirty="0">
-                <a:latin typeface="Courier" pitchFamily="2" charset="0"/>
-              </a:rPr>
-              <a:t>-C)</a:t>
-            </a:r>
-            <a:br>
-              <a:rPr lang="de-DE" sz="1000" dirty="0">
-                <a:latin typeface="Courier" pitchFamily="2" charset="0"/>
-              </a:rPr>
-            </a:br>
-            <a:br>
-              <a:rPr lang="de-DE" sz="1000" dirty="0">
-                <a:latin typeface="Courier" pitchFamily="2" charset="0"/>
-              </a:rPr>
-            </a:br>
-            <a:r>
-              <a:rPr lang="de-DE" sz="1000" dirty="0">
-                <a:latin typeface="Courier" pitchFamily="2" charset="0"/>
-              </a:rPr>
-              <a:t>Time                              Type      Name         ID  </a:t>
-            </a:r>
-            <a:r>
-              <a:rPr lang="de-DE" sz="1000" dirty="0" err="1">
-                <a:latin typeface="Courier" pitchFamily="2" charset="0"/>
-              </a:rPr>
-              <a:t>Userid</a:t>
-            </a:r>
-            <a:r>
-              <a:rPr lang="de-DE" sz="1000" dirty="0">
-                <a:latin typeface="Courier" pitchFamily="2" charset="0"/>
-              </a:rPr>
-              <a:t>      Message</a:t>
-            </a:r>
-            <a:br>
-              <a:rPr lang="de-DE" sz="1000" dirty="0">
-                <a:latin typeface="Courier" pitchFamily="2" charset="0"/>
-              </a:rPr>
-            </a:br>
-            <a:r>
-              <a:rPr lang="de-DE" sz="1000" dirty="0">
-                <a:latin typeface="Courier" pitchFamily="2" charset="0"/>
-              </a:rPr>
-              <a:t>----------------------------------------------------------------------------------------------------------------…</a:t>
-            </a:r>
-            <a:br>
-              <a:rPr lang="de-DE" sz="1000" dirty="0">
-                <a:latin typeface="Courier" pitchFamily="2" charset="0"/>
-              </a:rPr>
-            </a:br>
-            <a:r>
-              <a:rPr lang="de-DE" sz="1000" dirty="0">
-                <a:latin typeface="Courier" pitchFamily="2" charset="0"/>
-              </a:rPr>
-              <a:t>2019-08-08 08:52:16.340000+02:00  Security  WSA </a:t>
-            </a:r>
-            <a:r>
-              <a:rPr lang="de-DE" sz="1000" dirty="0" err="1">
-                <a:latin typeface="Courier" pitchFamily="2" charset="0"/>
-              </a:rPr>
-              <a:t>Logon</a:t>
-            </a:r>
-            <a:r>
-              <a:rPr lang="de-DE" sz="1000" dirty="0">
-                <a:latin typeface="Courier" pitchFamily="2" charset="0"/>
-              </a:rPr>
-              <a:t>  1941  </a:t>
-            </a:r>
-            <a:r>
-              <a:rPr lang="de-DE" sz="1000" dirty="0" err="1">
-                <a:latin typeface="Courier" pitchFamily="2" charset="0"/>
-              </a:rPr>
-              <a:t>zbcInstall</a:t>
-            </a:r>
-            <a:r>
-              <a:rPr lang="de-DE" sz="1000" dirty="0">
-                <a:latin typeface="Courier" pitchFamily="2" charset="0"/>
-              </a:rPr>
-              <a:t>  User </a:t>
-            </a:r>
-            <a:r>
-              <a:rPr lang="de-DE" sz="1000" dirty="0" err="1">
-                <a:latin typeface="Courier" pitchFamily="2" charset="0"/>
-              </a:rPr>
-              <a:t>zbcInstall</a:t>
-            </a:r>
-            <a:r>
-              <a:rPr lang="de-DE" sz="1000" dirty="0">
-                <a:latin typeface="Courier" pitchFamily="2" charset="0"/>
-              </a:rPr>
-              <a:t> </a:t>
-            </a:r>
-            <a:r>
-              <a:rPr lang="de-DE" sz="1000" dirty="0" err="1">
-                <a:latin typeface="Courier" pitchFamily="2" charset="0"/>
-              </a:rPr>
-              <a:t>has</a:t>
-            </a:r>
-            <a:r>
-              <a:rPr lang="de-DE" sz="1000" dirty="0">
-                <a:latin typeface="Courier" pitchFamily="2" charset="0"/>
-              </a:rPr>
-              <a:t> </a:t>
-            </a:r>
-            <a:r>
-              <a:rPr lang="de-DE" sz="1000" dirty="0" err="1">
-                <a:latin typeface="Courier" pitchFamily="2" charset="0"/>
-              </a:rPr>
-              <a:t>logged</a:t>
-            </a:r>
-            <a:r>
-              <a:rPr lang="de-DE" sz="1000" dirty="0">
-                <a:latin typeface="Courier" pitchFamily="2" charset="0"/>
-              </a:rPr>
-              <a:t> on </a:t>
-            </a:r>
-            <a:r>
-              <a:rPr lang="de-DE" sz="1000" dirty="0" err="1">
-                <a:latin typeface="Courier" pitchFamily="2" charset="0"/>
-              </a:rPr>
-              <a:t>to</a:t>
-            </a:r>
-            <a:r>
-              <a:rPr lang="de-DE" sz="1000" dirty="0">
-                <a:latin typeface="Courier" pitchFamily="2" charset="0"/>
-              </a:rPr>
-              <a:t> Web Se…</a:t>
-            </a:r>
-            <a:br>
-              <a:rPr lang="de-DE" sz="1000" dirty="0">
-                <a:latin typeface="Courier" pitchFamily="2" charset="0"/>
-              </a:rPr>
-            </a:br>
-            <a:r>
-              <a:rPr lang="de-DE" sz="1000" dirty="0" err="1">
-                <a:latin typeface="Courier" pitchFamily="2" charset="0"/>
-              </a:rPr>
-              <a:t>Starting</a:t>
-            </a:r>
-            <a:r>
-              <a:rPr lang="de-DE" sz="1000" dirty="0">
-                <a:latin typeface="Courier" pitchFamily="2" charset="0"/>
-              </a:rPr>
-              <a:t> </a:t>
-            </a:r>
-            <a:r>
-              <a:rPr lang="de-DE" sz="1000" dirty="0" err="1">
-                <a:latin typeface="Courier" pitchFamily="2" charset="0"/>
-              </a:rPr>
-              <a:t>to</a:t>
-            </a:r>
-            <a:r>
-              <a:rPr lang="de-DE" sz="1000" dirty="0">
-                <a:latin typeface="Courier" pitchFamily="2" charset="0"/>
-              </a:rPr>
-              <a:t> </a:t>
-            </a:r>
-            <a:r>
-              <a:rPr lang="de-DE" sz="1000" dirty="0" err="1">
-                <a:latin typeface="Courier" pitchFamily="2" charset="0"/>
-              </a:rPr>
-              <a:t>wait</a:t>
-            </a:r>
-            <a:r>
-              <a:rPr lang="de-DE" sz="1000" dirty="0">
-                <a:latin typeface="Courier" pitchFamily="2" charset="0"/>
-              </a:rPr>
-              <a:t> </a:t>
-            </a:r>
-            <a:r>
-              <a:rPr lang="de-DE" sz="1000" dirty="0" err="1">
-                <a:latin typeface="Courier" pitchFamily="2" charset="0"/>
-              </a:rPr>
-              <a:t>for</a:t>
-            </a:r>
-            <a:r>
-              <a:rPr lang="de-DE" sz="1000" dirty="0">
-                <a:latin typeface="Courier" pitchFamily="2" charset="0"/>
-              </a:rPr>
-              <a:t> </a:t>
-            </a:r>
-            <a:r>
-              <a:rPr lang="de-DE" sz="1000" dirty="0" err="1">
-                <a:latin typeface="Courier" pitchFamily="2" charset="0"/>
-              </a:rPr>
-              <a:t>future</a:t>
-            </a:r>
-            <a:r>
-              <a:rPr lang="de-DE" sz="1000" dirty="0">
-                <a:latin typeface="Courier" pitchFamily="2" charset="0"/>
-              </a:rPr>
-              <a:t> log </a:t>
-            </a:r>
-            <a:r>
-              <a:rPr lang="de-DE" sz="1000" dirty="0" err="1">
-                <a:latin typeface="Courier" pitchFamily="2" charset="0"/>
-              </a:rPr>
-              <a:t>entries</a:t>
-            </a:r>
-            <a:br>
-              <a:rPr lang="de-DE" sz="1000" dirty="0">
-                <a:latin typeface="Courier" pitchFamily="2" charset="0"/>
-              </a:rPr>
-            </a:br>
-            <a:r>
-              <a:rPr lang="de-DE" sz="1000" dirty="0">
-                <a:latin typeface="Courier" pitchFamily="2" charset="0"/>
-              </a:rPr>
-              <a:t>2019-08-08 08:52:37.050000+02:00  Audit     WSAPI      6055  </a:t>
-            </a:r>
-            <a:r>
-              <a:rPr lang="de-DE" sz="1000" dirty="0" err="1">
-                <a:latin typeface="Courier" pitchFamily="2" charset="0"/>
-              </a:rPr>
-              <a:t>zbcInstall</a:t>
-            </a:r>
-            <a:r>
-              <a:rPr lang="de-DE" sz="1000" dirty="0">
-                <a:latin typeface="Courier" pitchFamily="2" charset="0"/>
-              </a:rPr>
-              <a:t>  A web </a:t>
-            </a:r>
-            <a:r>
-              <a:rPr lang="de-DE" sz="1000" dirty="0" err="1">
-                <a:latin typeface="Courier" pitchFamily="2" charset="0"/>
-              </a:rPr>
-              <a:t>services</a:t>
-            </a:r>
-            <a:r>
-              <a:rPr lang="de-DE" sz="1000" dirty="0">
-                <a:latin typeface="Courier" pitchFamily="2" charset="0"/>
-              </a:rPr>
-              <a:t> </a:t>
-            </a:r>
-            <a:r>
-              <a:rPr lang="de-DE" sz="1000" dirty="0" err="1">
-                <a:latin typeface="Courier" pitchFamily="2" charset="0"/>
-              </a:rPr>
-              <a:t>client</a:t>
-            </a:r>
-            <a:r>
-              <a:rPr lang="de-DE" sz="1000" dirty="0">
-                <a:latin typeface="Courier" pitchFamily="2" charset="0"/>
-              </a:rPr>
-              <a:t> on 10.183.204.141…</a:t>
-            </a:r>
-            <a:br>
-              <a:rPr lang="de-DE" sz="1000" dirty="0">
-                <a:latin typeface="Courier" pitchFamily="2" charset="0"/>
-              </a:rPr>
-            </a:br>
-            <a:r>
-              <a:rPr lang="de-DE" sz="1000" dirty="0">
-                <a:latin typeface="Courier" pitchFamily="2" charset="0"/>
-              </a:rPr>
-              <a:t>2019-08-08 08:52:37.530000+02:00  Audit     WSAPI      6055              A web </a:t>
-            </a:r>
-            <a:r>
-              <a:rPr lang="de-DE" sz="1000" dirty="0" err="1">
-                <a:latin typeface="Courier" pitchFamily="2" charset="0"/>
-              </a:rPr>
-              <a:t>services</a:t>
-            </a:r>
-            <a:r>
-              <a:rPr lang="de-DE" sz="1000" dirty="0">
-                <a:latin typeface="Courier" pitchFamily="2" charset="0"/>
-              </a:rPr>
-              <a:t> </a:t>
-            </a:r>
-            <a:r>
-              <a:rPr lang="de-DE" sz="1000" dirty="0" err="1">
-                <a:latin typeface="Courier" pitchFamily="2" charset="0"/>
-              </a:rPr>
-              <a:t>client</a:t>
-            </a:r>
-            <a:r>
-              <a:rPr lang="de-DE" sz="1000" dirty="0">
-                <a:latin typeface="Courier" pitchFamily="2" charset="0"/>
-              </a:rPr>
-              <a:t> on 10.183.204.141…</a:t>
-            </a:r>
-            <a:br>
-              <a:rPr lang="de-DE" sz="1000" dirty="0">
-                <a:latin typeface="Courier" pitchFamily="2" charset="0"/>
-              </a:rPr>
-            </a:br>
-            <a:r>
-              <a:rPr lang="de-DE" sz="1000" dirty="0">
-                <a:latin typeface="Courier" pitchFamily="2" charset="0"/>
-              </a:rPr>
-              <a:t>^C--------------------------------------------------------------------------------------------------------------…</a:t>
-            </a:r>
-            <a:br>
-              <a:rPr lang="de-DE" sz="1000" dirty="0">
-                <a:latin typeface="Courier" pitchFamily="2" charset="0"/>
-              </a:rPr>
-            </a:br>
-            <a:r>
-              <a:rPr lang="de-DE" sz="1000" dirty="0" err="1">
-                <a:latin typeface="Courier" pitchFamily="2" charset="0"/>
-              </a:rPr>
-              <a:t>Stopping</a:t>
-            </a:r>
-            <a:r>
-              <a:rPr lang="de-DE" sz="1000" dirty="0">
-                <a:latin typeface="Courier" pitchFamily="2" charset="0"/>
-              </a:rPr>
-              <a:t> </a:t>
-            </a:r>
-            <a:r>
-              <a:rPr lang="de-DE" sz="1000" dirty="0" err="1">
-                <a:latin typeface="Courier" pitchFamily="2" charset="0"/>
-              </a:rPr>
-              <a:t>to</a:t>
-            </a:r>
-            <a:r>
-              <a:rPr lang="de-DE" sz="1000" dirty="0">
-                <a:latin typeface="Courier" pitchFamily="2" charset="0"/>
-              </a:rPr>
-              <a:t> </a:t>
-            </a:r>
-            <a:r>
-              <a:rPr lang="de-DE" sz="1000" dirty="0" err="1">
-                <a:latin typeface="Courier" pitchFamily="2" charset="0"/>
-              </a:rPr>
-              <a:t>wait</a:t>
-            </a:r>
-            <a:r>
-              <a:rPr lang="de-DE" sz="1000" dirty="0">
-                <a:latin typeface="Courier" pitchFamily="2" charset="0"/>
-              </a:rPr>
-              <a:t> </a:t>
-            </a:r>
-            <a:r>
-              <a:rPr lang="de-DE" sz="1000" dirty="0" err="1">
-                <a:latin typeface="Courier" pitchFamily="2" charset="0"/>
-              </a:rPr>
-              <a:t>for</a:t>
-            </a:r>
-            <a:r>
-              <a:rPr lang="de-DE" sz="1000" dirty="0">
-                <a:latin typeface="Courier" pitchFamily="2" charset="0"/>
-              </a:rPr>
-              <a:t> </a:t>
-            </a:r>
-            <a:r>
-              <a:rPr lang="de-DE" sz="1000" dirty="0" err="1">
-                <a:latin typeface="Courier" pitchFamily="2" charset="0"/>
-              </a:rPr>
-              <a:t>future</a:t>
-            </a:r>
-            <a:r>
-              <a:rPr lang="de-DE" sz="1000" dirty="0">
-                <a:latin typeface="Courier" pitchFamily="2" charset="0"/>
-              </a:rPr>
-              <a:t> log </a:t>
-            </a:r>
-            <a:r>
-              <a:rPr lang="de-DE" sz="1000" dirty="0" err="1">
-                <a:latin typeface="Courier" pitchFamily="2" charset="0"/>
-              </a:rPr>
-              <a:t>entries</a:t>
-            </a:r>
-            <a:br>
-              <a:rPr lang="de-DE" sz="1000" dirty="0">
-                <a:latin typeface="Courier" pitchFamily="2" charset="0"/>
-              </a:rPr>
-            </a:br>
-            <a:r>
-              <a:rPr lang="de-DE" sz="1000" dirty="0" err="1">
-                <a:latin typeface="Courier" pitchFamily="2" charset="0"/>
-              </a:rPr>
-              <a:t>Closing</a:t>
-            </a:r>
-            <a:r>
-              <a:rPr lang="de-DE" sz="1000" dirty="0">
-                <a:latin typeface="Courier" pitchFamily="2" charset="0"/>
-              </a:rPr>
-              <a:t> </a:t>
-            </a:r>
-            <a:r>
-              <a:rPr lang="de-DE" sz="1000" dirty="0" err="1">
-                <a:latin typeface="Courier" pitchFamily="2" charset="0"/>
-              </a:rPr>
-              <a:t>notification</a:t>
-            </a:r>
-            <a:r>
-              <a:rPr lang="de-DE" sz="1000" dirty="0">
-                <a:latin typeface="Courier" pitchFamily="2" charset="0"/>
-              </a:rPr>
-              <a:t> </a:t>
-            </a:r>
-            <a:r>
-              <a:rPr lang="de-DE" sz="1000" dirty="0" err="1">
-                <a:latin typeface="Courier" pitchFamily="2" charset="0"/>
-              </a:rPr>
-              <a:t>receiver</a:t>
-            </a:r>
-            <a:br>
-              <a:rPr lang="de-DE" sz="1000" dirty="0">
-                <a:latin typeface="Courier" pitchFamily="2" charset="0"/>
-              </a:rPr>
-            </a:br>
-            <a:r>
-              <a:rPr lang="de-DE" sz="1000" dirty="0" err="1">
-                <a:latin typeface="Courier" pitchFamily="2" charset="0"/>
-              </a:rPr>
               <a:t>Logging</a:t>
             </a:r>
             <a:r>
@@ -6778,6 +7499,14 @@
               </a:rPr>
               <a:t> off</a:t>
             </a:r>
+            <a:br>
+              <a:rPr lang="de-DE" sz="1000" dirty="0">
+                <a:latin typeface="Courier" pitchFamily="2" charset="0"/>
+              </a:rPr>
+            </a:br>
+            <a:endParaRPr lang="de-DE" sz="1000" dirty="0">
+              <a:latin typeface="Courier" pitchFamily="2" charset="0"/>
+            </a:endParaRPr>
           </a:p>
         </p:txBody>
       </p:sp>

</xml_diff>

<commit_message>
Updated presentation with time_format parm
Signed-off-by: Andreas Maier <maiera@de.ibm.com>
</commit_message>
<xml_diff>
--- a/IBM_Z_HMC_Log_Forwarder.pptx
+++ b/IBM_Z_HMC_Log_Forwarder.pptx
@@ -1630,7 +1630,7 @@
             </a:br>
             <a:r>
               <a:rPr lang="de-DE" sz="1300" dirty="0"/>
-              <a:t>2019-08-07</a:t>
+              <a:t>2019-08-09</a:t>
             </a:r>
           </a:p>
         </p:txBody>
@@ -2989,7 +2989,7 @@
         </p:spPr>
         <p:txBody>
           <a:bodyPr tIns="46800">
-            <a:normAutofit/>
+            <a:normAutofit lnSpcReduction="10000"/>
           </a:bodyPr>
           <a:lstStyle/>
           <a:p>
@@ -3188,9 +3188,26 @@
             </a:r>
             <a:r>
               <a:rPr lang="en-US" spc="-1" dirty="0" err="1"/>
-              <a:t>QRadar</a:t>
+              <a:t>Qradar</a:t>
             </a:r>
             <a:endParaRPr lang="en-US" spc="-1" dirty="0"/>
+          </a:p>
+          <a:p>
+            <a:pPr>
+              <a:spcAft>
+                <a:spcPts val="289"/>
+              </a:spcAft>
+              <a:buClr>
+                <a:srgbClr val="000000"/>
+              </a:buClr>
+              <a:buSzPct val="45000"/>
+              <a:buFont typeface="Wingdings" pitchFamily="2" charset="2"/>
+              <a:buChar char=""/>
+            </a:pPr>
+            <a:r>
+              <a:rPr lang="en-US" spc="-1" dirty="0"/>
+              <a:t>Supports custom formatting the output for log entries</a:t>
+            </a:r>
           </a:p>
           <a:p>
             <a:pPr marL="0" indent="0">
@@ -5546,7 +5563,19 @@
               <a:rPr lang="de-DE" sz="1100" dirty="0">
                 <a:latin typeface="Courier" pitchFamily="2" charset="0"/>
               </a:rPr>
-              <a:t>: '{time:32}  {type:8}  {name:12}  {</a:t>
+              <a:t>: '{time:32}  {</a:t>
+            </a:r>
+            <a:r>
+              <a:rPr lang="de-DE" sz="1100" dirty="0" err="1">
+                <a:latin typeface="Courier" pitchFamily="2" charset="0"/>
+              </a:rPr>
+              <a:t>label</a:t>
+            </a:r>
+            <a:r>
+              <a:rPr lang="de-DE" sz="1100" dirty="0">
+                <a:latin typeface="Courier" pitchFamily="2" charset="0"/>
+              </a:rPr>
+              <a:t>}  {type:8}  {name:12}  {</a:t>
             </a:r>
             <a:r>
               <a:rPr lang="de-DE" sz="1100" dirty="0" err="1">
@@ -5577,6 +5606,65 @@
                 <a:latin typeface="Courier" pitchFamily="2" charset="0"/>
               </a:rPr>
               <a:t>format</a:t>
+            </a:r>
+            <a:br>
+              <a:rPr lang="de-DE" sz="1100" dirty="0">
+                <a:latin typeface="Courier" pitchFamily="2" charset="0"/>
+              </a:rPr>
+            </a:br>
+            <a:r>
+              <a:rPr lang="de-DE" sz="1100" dirty="0" err="1">
+                <a:latin typeface="Courier" pitchFamily="2" charset="0"/>
+              </a:rPr>
+              <a:t>time_format</a:t>
+            </a:r>
+            <a:r>
+              <a:rPr lang="de-DE" sz="1100" dirty="0">
+                <a:latin typeface="Courier" pitchFamily="2" charset="0"/>
+              </a:rPr>
+              <a:t>: '%Y-%m-%d %H:%M:%S.%</a:t>
+            </a:r>
+            <a:r>
+              <a:rPr lang="de-DE" sz="1100" dirty="0" err="1">
+                <a:latin typeface="Courier" pitchFamily="2" charset="0"/>
+              </a:rPr>
+              <a:t>f%z</a:t>
+            </a:r>
+            <a:r>
+              <a:rPr lang="de-DE" sz="1100" dirty="0">
+                <a:latin typeface="Courier" pitchFamily="2" charset="0"/>
+              </a:rPr>
+              <a:t>‘   # Format </a:t>
+            </a:r>
+            <a:r>
+              <a:rPr lang="de-DE" sz="1100" dirty="0" err="1">
+                <a:latin typeface="Courier" pitchFamily="2" charset="0"/>
+              </a:rPr>
+              <a:t>for</a:t>
+            </a:r>
+            <a:r>
+              <a:rPr lang="de-DE" sz="1100" dirty="0">
+                <a:latin typeface="Courier" pitchFamily="2" charset="0"/>
+              </a:rPr>
+              <a:t> time </a:t>
+            </a:r>
+            <a:r>
+              <a:rPr lang="de-DE" sz="1100" dirty="0" err="1">
+                <a:latin typeface="Courier" pitchFamily="2" charset="0"/>
+              </a:rPr>
+              <a:t>field</a:t>
+            </a:r>
+            <a:r>
+              <a:rPr lang="de-DE" sz="1100" dirty="0">
+                <a:latin typeface="Courier" pitchFamily="2" charset="0"/>
+              </a:rPr>
+              <a:t> in </a:t>
+            </a:r>
+            <a:r>
+              <a:rPr lang="de-DE" sz="1100" dirty="0" err="1">
+                <a:latin typeface="Courier" pitchFamily="2" charset="0"/>
+              </a:rPr>
+              <a:t>output</a:t>
             </a:r>
             <a:endParaRPr lang="de-DE" sz="1100" dirty="0">
               <a:latin typeface="Courier" pitchFamily="2" charset="0"/>
@@ -5820,7 +5908,7 @@
             </a:r>
             <a:r>
               <a:rPr lang="de-DE" sz="1200" dirty="0"/>
-              <a:t>:   The time </a:t>
+              <a:t>:     Time </a:t>
             </a:r>
             <a:r>
               <a:rPr lang="de-DE" sz="1200" dirty="0" err="1"/>
@@ -5852,10 +5940,34 @@
             </a:r>
             <a:r>
               <a:rPr lang="de-DE" sz="1200" dirty="0"/>
-              <a:t>, e.g. 2019-08-07 05:56:37.177189+02:00.</a:t>
-            </a:r>
-            <a:br>
+              <a:t>. Format </a:t>
+            </a:r>
+            <a:r>
+              <a:rPr lang="de-DE" sz="1200" dirty="0" err="1"/>
+              <a:t>can</a:t>
+            </a:r>
+            <a:r>
               <a:rPr lang="de-DE" sz="1200" dirty="0"/>
+              <a:t> </a:t>
+            </a:r>
+            <a:r>
+              <a:rPr lang="de-DE" sz="1200" dirty="0" err="1"/>
+              <a:t>be</a:t>
+            </a:r>
+            <a:r>
+              <a:rPr lang="de-DE" sz="1200" dirty="0"/>
+              <a:t> </a:t>
+            </a:r>
+            <a:r>
+              <a:rPr lang="de-DE" sz="1200" dirty="0" err="1"/>
+              <a:t>customized</a:t>
+            </a:r>
+            <a:r>
+              <a:rPr lang="de-DE" sz="1200" dirty="0"/>
+              <a:t>.</a:t>
+            </a:r>
+            <a:br>
+              <a:rPr lang="de-DE" sz="1200" dirty="0"/>
             </a:br>
             <a:r>
               <a:rPr lang="de-DE" sz="1200" dirty="0" err="1">
@@ -5865,15 +5977,7 @@
             </a:r>
             <a:r>
               <a:rPr lang="de-DE" sz="1200" dirty="0"/>
-              <a:t>: The </a:t>
-            </a:r>
-            <a:r>
-              <a:rPr lang="de-DE" sz="1200" dirty="0" err="1"/>
-              <a:t>label</a:t>
-            </a:r>
-            <a:r>
-              <a:rPr lang="de-DE" sz="1200" dirty="0"/>
-              <a:t> </a:t>
+              <a:t>:   Label </a:t>
             </a:r>
             <a:r>
               <a:rPr lang="de-DE" sz="1200" dirty="0" err="1"/>
@@ -5934,7 +6038,7 @@
             </a:r>
             <a:r>
               <a:rPr lang="de-DE" sz="1200" dirty="0"/>
-              <a:t>:   The log type: Security, Audit.</a:t>
+              <a:t>:     Log type: Security, Audit.</a:t>
             </a:r>
             <a:br>
               <a:rPr lang="de-DE" sz="1200" dirty="0"/>
@@ -5947,15 +6051,7 @@
             </a:r>
             <a:r>
               <a:rPr lang="de-DE" sz="1200" dirty="0"/>
-              <a:t>:   The </a:t>
-            </a:r>
-            <a:r>
-              <a:rPr lang="de-DE" sz="1200" dirty="0" err="1"/>
-              <a:t>name</a:t>
-            </a:r>
-            <a:r>
-              <a:rPr lang="de-DE" sz="1200" dirty="0"/>
-              <a:t> </a:t>
+              <a:t>:     Name </a:t>
             </a:r>
             <a:r>
               <a:rPr lang="de-DE" sz="1200" dirty="0" err="1"/>
@@ -5992,7 +6088,7 @@
             </a:r>
             <a:r>
               <a:rPr lang="de-DE" sz="1200" dirty="0"/>
-              <a:t>:       The ID </a:t>
+              <a:t>:         ID </a:t>
             </a:r>
             <a:r>
               <a:rPr lang="de-DE" sz="1200" dirty="0" err="1"/>
@@ -6029,7 +6125,7 @@
             </a:r>
             <a:r>
               <a:rPr lang="de-DE" sz="1200" dirty="0"/>
-              <a:t>:   The HMC </a:t>
+              <a:t>:     HMC </a:t>
             </a:r>
             <a:r>
               <a:rPr lang="de-DE" sz="1200" dirty="0" err="1"/>
@@ -6085,7 +6181,88 @@
             </a:r>
             <a:r>
               <a:rPr lang="de-DE" sz="1200" dirty="0"/>
-              <a:t>:     The </a:t>
+              <a:t>:       </a:t>
+            </a:r>
+            <a:r>
+              <a:rPr lang="de-DE" sz="1200" dirty="0" err="1"/>
+              <a:t>Fully</a:t>
+            </a:r>
+            <a:r>
+              <a:rPr lang="de-DE" sz="1200" dirty="0"/>
+              <a:t> </a:t>
+            </a:r>
+            <a:r>
+              <a:rPr lang="de-DE" sz="1200" dirty="0" err="1"/>
+              <a:t>formatted</a:t>
+            </a:r>
+            <a:r>
+              <a:rPr lang="de-DE" sz="1200" dirty="0"/>
+              <a:t> log </a:t>
+            </a:r>
+            <a:r>
+              <a:rPr lang="de-DE" sz="1200" dirty="0" err="1"/>
+              <a:t>message</a:t>
+            </a:r>
+            <a:r>
+              <a:rPr lang="de-DE" sz="1200" dirty="0"/>
+              <a:t>, in English.</a:t>
+            </a:r>
+            <a:br>
+              <a:rPr lang="de-DE" sz="1200" dirty="0"/>
+            </a:br>
+            <a:r>
+              <a:rPr lang="de-DE" sz="1200" dirty="0" err="1">
+                <a:latin typeface="Courier" pitchFamily="2" charset="0"/>
+              </a:rPr>
+              <a:t>msg_vars</a:t>
+            </a:r>
+            <a:r>
+              <a:rPr lang="de-DE" sz="1200" dirty="0"/>
+              <a:t>:  Substitution variables </a:t>
+            </a:r>
+            <a:r>
+              <a:rPr lang="de-DE" sz="1200" dirty="0" err="1"/>
+              <a:t>used</a:t>
+            </a:r>
+            <a:r>
+              <a:rPr lang="de-DE" sz="1200" dirty="0"/>
+              <a:t> in </a:t>
+            </a:r>
+            <a:r>
+              <a:rPr lang="de-DE" sz="1200" dirty="0" err="1"/>
+              <a:t>the</a:t>
+            </a:r>
+            <a:r>
+              <a:rPr lang="de-DE" sz="1200" dirty="0"/>
+              <a:t> log </a:t>
+            </a:r>
+            <a:r>
+              <a:rPr lang="de-DE" sz="1200" dirty="0" err="1"/>
+              <a:t>message</a:t>
+            </a:r>
+            <a:br>
+              <a:rPr lang="de-DE" sz="1200" dirty="0"/>
+            </a:br>
+            <a:br>
+              <a:rPr lang="de-DE" sz="1200" dirty="0"/>
+            </a:br>
+            <a:r>
+              <a:rPr lang="de-DE" sz="1200" dirty="0" err="1">
+                <a:latin typeface="Courier" pitchFamily="2" charset="0"/>
+              </a:rPr>
+              <a:t>detail_msgs</a:t>
+            </a:r>
+            <a:r>
+              <a:rPr lang="de-DE" sz="1200" dirty="0"/>
+              <a:t>:   List </a:t>
+            </a:r>
+            <a:r>
+              <a:rPr lang="de-DE" sz="1200" dirty="0" err="1"/>
+              <a:t>of</a:t>
+            </a:r>
+            <a:r>
+              <a:rPr lang="de-DE" sz="1200" dirty="0"/>
+              <a:t> </a:t>
             </a:r>
             <a:r>
               <a:rPr lang="de-DE" sz="1200" dirty="0" err="1"/>
@@ -6101,11 +6278,19 @@
             </a:r>
             <a:r>
               <a:rPr lang="de-DE" sz="1200" dirty="0"/>
+              <a:t> </a:t>
+            </a:r>
+            <a:r>
+              <a:rPr lang="de-DE" sz="1200" dirty="0" err="1"/>
+              <a:t>detail</a:t>
+            </a:r>
+            <a:r>
+              <a:rPr lang="de-DE" sz="1200" dirty="0"/>
               <a:t> log </a:t>
             </a:r>
             <a:r>
               <a:rPr lang="de-DE" sz="1200" dirty="0" err="1"/>
-              <a:t>message</a:t>
+              <a:t>messages</a:t>
             </a:r>
             <a:r>
               <a:rPr lang="de-DE" sz="1200" dirty="0"/>
@@ -6118,124 +6303,11 @@
               <a:rPr lang="de-DE" sz="1200" dirty="0" err="1">
                 <a:latin typeface="Courier" pitchFamily="2" charset="0"/>
               </a:rPr>
-              <a:t>msg_vars</a:t>
+              <a:t>detail_msgs_vars</a:t>
             </a:r>
             <a:r>
               <a:rPr lang="de-DE" sz="1200" dirty="0"/>
-              <a:t>:  The </a:t>
-            </a:r>
-            <a:r>
-              <a:rPr lang="de-DE" sz="1200" dirty="0" err="1"/>
-              <a:t>substitution</a:t>
-            </a:r>
-            <a:r>
-              <a:rPr lang="de-DE" sz="1200" dirty="0"/>
-              <a:t> variables </a:t>
-            </a:r>
-            <a:r>
-              <a:rPr lang="de-DE" sz="1200" dirty="0" err="1"/>
-              <a:t>used</a:t>
-            </a:r>
-            <a:r>
-              <a:rPr lang="de-DE" sz="1200" dirty="0"/>
-              <a:t> in </a:t>
-            </a:r>
-            <a:r>
-              <a:rPr lang="de-DE" sz="1200" dirty="0" err="1"/>
-              <a:t>the</a:t>
-            </a:r>
-            <a:r>
-              <a:rPr lang="de-DE" sz="1200" dirty="0"/>
-              <a:t> log </a:t>
-            </a:r>
-            <a:r>
-              <a:rPr lang="de-DE" sz="1200" dirty="0" err="1"/>
-              <a:t>message</a:t>
-            </a:r>
-            <a:br>
-              <a:rPr lang="de-DE" sz="1200" dirty="0"/>
-            </a:br>
-            <a:br>
-              <a:rPr lang="de-DE" sz="1200" dirty="0"/>
-            </a:br>
-            <a:r>
-              <a:rPr lang="de-DE" sz="1200" dirty="0" err="1">
-                <a:latin typeface="Courier" pitchFamily="2" charset="0"/>
-              </a:rPr>
-              <a:t>detail_msgs</a:t>
-            </a:r>
-            <a:r>
-              <a:rPr lang="de-DE" sz="1200" dirty="0"/>
-              <a:t>:   The </a:t>
-            </a:r>
-            <a:r>
-              <a:rPr lang="de-DE" sz="1200" dirty="0" err="1"/>
-              <a:t>list</a:t>
-            </a:r>
-            <a:r>
-              <a:rPr lang="de-DE" sz="1200" dirty="0"/>
-              <a:t> </a:t>
-            </a:r>
-            <a:r>
-              <a:rPr lang="de-DE" sz="1200" dirty="0" err="1"/>
-              <a:t>of</a:t>
-            </a:r>
-            <a:r>
-              <a:rPr lang="de-DE" sz="1200" dirty="0"/>
-              <a:t> </a:t>
-            </a:r>
-            <a:r>
-              <a:rPr lang="de-DE" sz="1200" dirty="0" err="1"/>
-              <a:t>fully</a:t>
-            </a:r>
-            <a:r>
-              <a:rPr lang="de-DE" sz="1200" dirty="0"/>
-              <a:t> </a:t>
-            </a:r>
-            <a:r>
-              <a:rPr lang="de-DE" sz="1200" dirty="0" err="1"/>
-              <a:t>formatted</a:t>
-            </a:r>
-            <a:r>
-              <a:rPr lang="de-DE" sz="1200" dirty="0"/>
-              <a:t> </a:t>
-            </a:r>
-            <a:r>
-              <a:rPr lang="de-DE" sz="1200" dirty="0" err="1"/>
-              <a:t>detail</a:t>
-            </a:r>
-            <a:r>
-              <a:rPr lang="de-DE" sz="1200" dirty="0"/>
-              <a:t> log </a:t>
-            </a:r>
-            <a:r>
-              <a:rPr lang="de-DE" sz="1200" dirty="0" err="1"/>
-              <a:t>messages</a:t>
-            </a:r>
-            <a:r>
-              <a:rPr lang="de-DE" sz="1200" dirty="0"/>
-              <a:t>, in English.</a:t>
-            </a:r>
-            <a:br>
-              <a:rPr lang="de-DE" sz="1200" dirty="0"/>
-            </a:br>
-            <a:r>
-              <a:rPr lang="de-DE" sz="1200" dirty="0" err="1">
-                <a:latin typeface="Courier" pitchFamily="2" charset="0"/>
-              </a:rPr>
-              <a:t>detail_msgs_vars</a:t>
-            </a:r>
-            <a:r>
-              <a:rPr lang="de-DE" sz="1200" dirty="0"/>
-              <a:t>:  The </a:t>
-            </a:r>
-            <a:r>
-              <a:rPr lang="de-DE" sz="1200" dirty="0" err="1"/>
-              <a:t>substitution</a:t>
-            </a:r>
-            <a:r>
-              <a:rPr lang="de-DE" sz="1200" dirty="0"/>
-              <a:t> variables </a:t>
+              <a:t>:  Substitution variables </a:t>
             </a:r>
             <a:r>
               <a:rPr lang="de-DE" sz="1200" dirty="0" err="1"/>
@@ -6422,7 +6494,13 @@
               <a:rPr lang="de-DE" sz="1000" dirty="0">
                 <a:latin typeface="Courier" pitchFamily="2" charset="0"/>
               </a:rPr>
-              <a:t> 0.5.1.dev3</a:t>
+              <a:t> 0.5.1</a:t>
+            </a:r>
+            <a:r>
+              <a:rPr lang="de-DE" sz="1000">
+                <a:latin typeface="Courier" pitchFamily="2" charset="0"/>
+              </a:rPr>
+              <a:t>.dev6</a:t>
             </a:r>
             <a:br>
               <a:rPr lang="de-DE" sz="1000" dirty="0">
@@ -6561,7 +6639,7 @@
               <a:rPr lang="de-DE" sz="1000" dirty="0">
                 <a:latin typeface="Courier" pitchFamily="2" charset="0"/>
               </a:rPr>
-              <a:t> HMC:              wdc04-05_hmc1</a:t>
+              <a:t> HMC:              wdc04-05.HMC1</a:t>
             </a:r>
             <a:br>
               <a:rPr lang="de-DE" sz="1000" dirty="0">
@@ -6867,7 +6945,7 @@
               <a:rPr lang="de-DE" sz="1000" dirty="0">
                 <a:latin typeface="Courier" pitchFamily="2" charset="0"/>
               </a:rPr>
-              <a:t>Time                              Type      Name         ID  </a:t>
+              <a:t>Time                              Label          Type      Name         ID  </a:t>
             </a:r>
             <a:r>
               <a:rPr lang="de-DE" sz="1000" dirty="0" err="1">
@@ -6901,7 +6979,7 @@
               <a:rPr lang="de-DE" sz="1000" dirty="0">
                 <a:latin typeface="Courier" pitchFamily="2" charset="0"/>
               </a:rPr>
-              <a:t>2019-08-08 17:13:21.060000+02:00  Security  WSA </a:t>
+              <a:t>2019-08-08 17:13:21.060000+02:00  wdc04-05.HMC1  Security  WSA </a:t>
             </a:r>
             <a:r>
               <a:rPr lang="de-DE" sz="1000" dirty="0" err="1">
@@ -6949,19 +7027,24 @@
               <a:rPr lang="de-DE" sz="1000" dirty="0">
                 <a:latin typeface="Courier" pitchFamily="2" charset="0"/>
               </a:rPr>
-              <a:t> </a:t>
-            </a:r>
+              <a:t> logge…</a:t>
+            </a:r>
+            <a:br>
+              <a:rPr lang="de-DE" sz="1000" dirty="0">
+                <a:latin typeface="Courier" pitchFamily="2" charset="0"/>
+              </a:rPr>
+            </a:br>
             <a:r>
               <a:rPr lang="de-DE" sz="1000" dirty="0" err="1">
                 <a:latin typeface="Courier" pitchFamily="2" charset="0"/>
               </a:rPr>
-              <a:t>logged</a:t>
-            </a:r>
-            <a:r>
-              <a:rPr lang="de-DE" sz="1000" dirty="0">
-                <a:latin typeface="Courier" pitchFamily="2" charset="0"/>
-              </a:rPr>
-              <a:t> on </a:t>
+              <a:t>Starting</a:t>
+            </a:r>
+            <a:r>
+              <a:rPr lang="de-DE" sz="1000" dirty="0">
+                <a:latin typeface="Courier" pitchFamily="2" charset="0"/>
+              </a:rPr>
+              <a:t> </a:t>
             </a:r>
             <a:r>
               <a:rPr lang="de-DE" sz="1000" dirty="0" err="1">
@@ -6973,13 +7056,113 @@
               <a:rPr lang="de-DE" sz="1000" dirty="0">
                 <a:latin typeface="Courier" pitchFamily="2" charset="0"/>
               </a:rPr>
-              <a:t> Web </a:t>
+              <a:t> </a:t>
             </a:r>
             <a:r>
               <a:rPr lang="de-DE" sz="1000" dirty="0" err="1">
                 <a:latin typeface="Courier" pitchFamily="2" charset="0"/>
               </a:rPr>
-              <a:t>Ser</a:t>
+              <a:t>wait</a:t>
+            </a:r>
+            <a:r>
+              <a:rPr lang="de-DE" sz="1000" dirty="0">
+                <a:latin typeface="Courier" pitchFamily="2" charset="0"/>
+              </a:rPr>
+              <a:t> </a:t>
+            </a:r>
+            <a:r>
+              <a:rPr lang="de-DE" sz="1000" dirty="0" err="1">
+                <a:latin typeface="Courier" pitchFamily="2" charset="0"/>
+              </a:rPr>
+              <a:t>for</a:t>
+            </a:r>
+            <a:r>
+              <a:rPr lang="de-DE" sz="1000" dirty="0">
+                <a:latin typeface="Courier" pitchFamily="2" charset="0"/>
+              </a:rPr>
+              <a:t> </a:t>
+            </a:r>
+            <a:r>
+              <a:rPr lang="de-DE" sz="1000" dirty="0" err="1">
+                <a:latin typeface="Courier" pitchFamily="2" charset="0"/>
+              </a:rPr>
+              <a:t>future</a:t>
+            </a:r>
+            <a:r>
+              <a:rPr lang="de-DE" sz="1000" dirty="0">
+                <a:latin typeface="Courier" pitchFamily="2" charset="0"/>
+              </a:rPr>
+              <a:t> log </a:t>
+            </a:r>
+            <a:r>
+              <a:rPr lang="de-DE" sz="1000" dirty="0" err="1">
+                <a:latin typeface="Courier" pitchFamily="2" charset="0"/>
+              </a:rPr>
+              <a:t>entries</a:t>
+            </a:r>
+            <a:br>
+              <a:rPr lang="de-DE" sz="1000" dirty="0">
+                <a:latin typeface="Courier" pitchFamily="2" charset="0"/>
+              </a:rPr>
+            </a:br>
+            <a:r>
+              <a:rPr lang="de-DE" sz="1000" dirty="0">
+                <a:latin typeface="Courier" pitchFamily="2" charset="0"/>
+              </a:rPr>
+              <a:t>2019-08-08 17:14:05.590000+02:00  wdc04-05.HMC1  Audit     WSAPI      6055              A web </a:t>
+            </a:r>
+            <a:r>
+              <a:rPr lang="de-DE" sz="1000" dirty="0" err="1">
+                <a:latin typeface="Courier" pitchFamily="2" charset="0"/>
+              </a:rPr>
+              <a:t>services</a:t>
+            </a:r>
+            <a:r>
+              <a:rPr lang="de-DE" sz="1000" dirty="0">
+                <a:latin typeface="Courier" pitchFamily="2" charset="0"/>
+              </a:rPr>
+              <a:t> </a:t>
+            </a:r>
+            <a:r>
+              <a:rPr lang="de-DE" sz="1000" dirty="0" err="1">
+                <a:latin typeface="Courier" pitchFamily="2" charset="0"/>
+              </a:rPr>
+              <a:t>client</a:t>
+            </a:r>
+            <a:r>
+              <a:rPr lang="de-DE" sz="1000" dirty="0">
+                <a:latin typeface="Courier" pitchFamily="2" charset="0"/>
+              </a:rPr>
+              <a:t> on …</a:t>
+            </a:r>
+            <a:br>
+              <a:rPr lang="de-DE" sz="1000" dirty="0">
+                <a:latin typeface="Courier" pitchFamily="2" charset="0"/>
+              </a:rPr>
+            </a:br>
+            <a:r>
+              <a:rPr lang="de-DE" sz="1000" dirty="0">
+                <a:latin typeface="Courier" pitchFamily="2" charset="0"/>
+              </a:rPr>
+              <a:t>2019-08-08 17:15:45+02:00         wdc04-05.HMC1  Audit     RSFERROR    151              A remote </a:t>
+            </a:r>
+            <a:r>
+              <a:rPr lang="de-DE" sz="1000" dirty="0" err="1">
+                <a:latin typeface="Courier" pitchFamily="2" charset="0"/>
+              </a:rPr>
+              <a:t>connection</a:t>
+            </a:r>
+            <a:r>
+              <a:rPr lang="de-DE" sz="1000" dirty="0">
+                <a:latin typeface="Courier" pitchFamily="2" charset="0"/>
+              </a:rPr>
+              <a:t> </a:t>
+            </a:r>
+            <a:r>
+              <a:rPr lang="de-DE" sz="1000" dirty="0" err="1">
+                <a:latin typeface="Courier" pitchFamily="2" charset="0"/>
+              </a:rPr>
+              <a:t>faile</a:t>
             </a:r>
             <a:r>
               <a:rPr lang="de-DE" sz="1000" dirty="0">
@@ -6993,10 +7176,16 @@
               </a:rPr>
             </a:br>
             <a:r>
+              <a:rPr lang="de-DE" sz="1000" dirty="0">
+                <a:latin typeface="Courier" pitchFamily="2" charset="0"/>
+              </a:rPr>
+              <a:t>2019-08-08 17:15:46.270000+02:00  wdc04-05.HMC1  Audit     TRSF_FAIL   678              Remote </a:t>
+            </a:r>
+            <a:r>
               <a:rPr lang="de-DE" sz="1000" dirty="0" err="1">
                 <a:latin typeface="Courier" pitchFamily="2" charset="0"/>
               </a:rPr>
-              <a:t>Starting</a:t>
+              <a:t>support</a:t>
             </a:r>
             <a:r>
               <a:rPr lang="de-DE" sz="1000" dirty="0">
@@ -7008,7 +7197,7 @@
               <a:rPr lang="de-DE" sz="1000" dirty="0" err="1">
                 <a:latin typeface="Courier" pitchFamily="2" charset="0"/>
               </a:rPr>
-              <a:t>to</a:t>
+              <a:t>call</a:t>
             </a:r>
             <a:r>
               <a:rPr lang="de-DE" sz="1000" dirty="0">
@@ -7020,350 +7209,131 @@
               <a:rPr lang="de-DE" sz="1000" dirty="0" err="1">
                 <a:latin typeface="Courier" pitchFamily="2" charset="0"/>
               </a:rPr>
-              <a:t>wait</a:t>
-            </a:r>
-            <a:r>
-              <a:rPr lang="de-DE" sz="1000" dirty="0">
-                <a:latin typeface="Courier" pitchFamily="2" charset="0"/>
-              </a:rPr>
-              <a:t> </a:t>
+              <a:t>gener</a:t>
+            </a:r>
+            <a:r>
+              <a:rPr lang="de-DE" sz="1000" dirty="0">
+                <a:latin typeface="Courier" pitchFamily="2" charset="0"/>
+              </a:rPr>
+              <a:t>…</a:t>
+            </a:r>
+            <a:br>
+              <a:rPr lang="de-DE" sz="1000" dirty="0">
+                <a:latin typeface="Courier" pitchFamily="2" charset="0"/>
+              </a:rPr>
+            </a:br>
+            <a:r>
+              <a:rPr lang="de-DE" sz="1000" dirty="0">
+                <a:latin typeface="Courier" pitchFamily="2" charset="0"/>
+              </a:rPr>
+              <a:t>2019-08-08 17:15:56.550000+02:00  wdc04-05.HMC1  Security  WSA </a:t>
             </a:r>
             <a:r>
               <a:rPr lang="de-DE" sz="1000" dirty="0" err="1">
                 <a:latin typeface="Courier" pitchFamily="2" charset="0"/>
               </a:rPr>
-              <a:t>for</a:t>
-            </a:r>
-            <a:r>
-              <a:rPr lang="de-DE" sz="1000" dirty="0">
-                <a:latin typeface="Courier" pitchFamily="2" charset="0"/>
-              </a:rPr>
-              <a:t> </a:t>
+              <a:t>Logon</a:t>
+            </a:r>
+            <a:r>
+              <a:rPr lang="de-DE" sz="1000" dirty="0">
+                <a:latin typeface="Courier" pitchFamily="2" charset="0"/>
+              </a:rPr>
+              <a:t>  1941  </a:t>
             </a:r>
             <a:r>
               <a:rPr lang="de-DE" sz="1000" dirty="0" err="1">
                 <a:latin typeface="Courier" pitchFamily="2" charset="0"/>
               </a:rPr>
-              <a:t>future</a:t>
-            </a:r>
-            <a:r>
-              <a:rPr lang="de-DE" sz="1000" dirty="0">
-                <a:latin typeface="Courier" pitchFamily="2" charset="0"/>
-              </a:rPr>
-              <a:t> log </a:t>
+              <a:t>zbcInstall</a:t>
+            </a:r>
+            <a:r>
+              <a:rPr lang="de-DE" sz="1000" dirty="0">
+                <a:latin typeface="Courier" pitchFamily="2" charset="0"/>
+              </a:rPr>
+              <a:t>  User </a:t>
             </a:r>
             <a:r>
               <a:rPr lang="de-DE" sz="1000" dirty="0" err="1">
                 <a:latin typeface="Courier" pitchFamily="2" charset="0"/>
               </a:rPr>
-              <a:t>entries</a:t>
-            </a:r>
-            <a:br>
-              <a:rPr lang="de-DE" sz="1000" dirty="0">
-                <a:latin typeface="Courier" pitchFamily="2" charset="0"/>
-              </a:rPr>
-            </a:br>
-            <a:r>
-              <a:rPr lang="de-DE" sz="1000" dirty="0">
-                <a:latin typeface="Courier" pitchFamily="2" charset="0"/>
-              </a:rPr>
-              <a:t>2019-08-08 17:14:05.590000+02:00  Audit     WSAPI      6055              A web </a:t>
+              <a:t>zbcInstall</a:t>
+            </a:r>
+            <a:r>
+              <a:rPr lang="de-DE" sz="1000" dirty="0">
+                <a:latin typeface="Courier" pitchFamily="2" charset="0"/>
+              </a:rPr>
+              <a:t> </a:t>
             </a:r>
             <a:r>
               <a:rPr lang="de-DE" sz="1000" dirty="0" err="1">
                 <a:latin typeface="Courier" pitchFamily="2" charset="0"/>
               </a:rPr>
-              <a:t>services</a:t>
-            </a:r>
-            <a:r>
-              <a:rPr lang="de-DE" sz="1000" dirty="0">
-                <a:latin typeface="Courier" pitchFamily="2" charset="0"/>
-              </a:rPr>
-              <a:t> </a:t>
+              <a:t>has</a:t>
+            </a:r>
+            <a:r>
+              <a:rPr lang="de-DE" sz="1000" dirty="0">
+                <a:latin typeface="Courier" pitchFamily="2" charset="0"/>
+              </a:rPr>
+              <a:t> logge…</a:t>
+            </a:r>
+            <a:br>
+              <a:rPr lang="de-DE" sz="1000" dirty="0">
+                <a:latin typeface="Courier" pitchFamily="2" charset="0"/>
+              </a:rPr>
+            </a:br>
+            <a:r>
+              <a:rPr lang="de-DE" sz="1000" dirty="0">
+                <a:latin typeface="Courier" pitchFamily="2" charset="0"/>
+              </a:rPr>
+              <a:t>2019-08-08 17:15:56.840000+02:00  wdc04-05.HMC1  Security  WSA </a:t>
             </a:r>
             <a:r>
               <a:rPr lang="de-DE" sz="1000" dirty="0" err="1">
                 <a:latin typeface="Courier" pitchFamily="2" charset="0"/>
               </a:rPr>
-              <a:t>client</a:t>
-            </a:r>
-            <a:r>
-              <a:rPr lang="de-DE" sz="1000" dirty="0">
-                <a:latin typeface="Courier" pitchFamily="2" charset="0"/>
-              </a:rPr>
-              <a:t> on 10.183.204.141 …</a:t>
-            </a:r>
-            <a:br>
-              <a:rPr lang="de-DE" sz="1000" dirty="0">
-                <a:latin typeface="Courier" pitchFamily="2" charset="0"/>
-              </a:rPr>
-            </a:br>
-            <a:r>
-              <a:rPr lang="de-DE" sz="1000" dirty="0">
-                <a:latin typeface="Courier" pitchFamily="2" charset="0"/>
-              </a:rPr>
-              <a:t>2019-08-08 17:15:45+02:00         Audit     RSFERROR    151              A remote </a:t>
+              <a:t>Logoff</a:t>
+            </a:r>
+            <a:r>
+              <a:rPr lang="de-DE" sz="1000" dirty="0">
+                <a:latin typeface="Courier" pitchFamily="2" charset="0"/>
+              </a:rPr>
+              <a:t> 1942  </a:t>
             </a:r>
             <a:r>
               <a:rPr lang="de-DE" sz="1000" dirty="0" err="1">
                 <a:latin typeface="Courier" pitchFamily="2" charset="0"/>
               </a:rPr>
-              <a:t>connection</a:t>
-            </a:r>
-            <a:r>
-              <a:rPr lang="de-DE" sz="1000" dirty="0">
-                <a:latin typeface="Courier" pitchFamily="2" charset="0"/>
-              </a:rPr>
-              <a:t> </a:t>
+              <a:t>zbcInstall</a:t>
+            </a:r>
+            <a:r>
+              <a:rPr lang="de-DE" sz="1000" dirty="0">
+                <a:latin typeface="Courier" pitchFamily="2" charset="0"/>
+              </a:rPr>
+              <a:t>  User </a:t>
             </a:r>
             <a:r>
               <a:rPr lang="de-DE" sz="1000" dirty="0" err="1">
                 <a:latin typeface="Courier" pitchFamily="2" charset="0"/>
               </a:rPr>
-              <a:t>failed</a:t>
-            </a:r>
-            <a:r>
-              <a:rPr lang="de-DE" sz="1000" dirty="0">
-                <a:latin typeface="Courier" pitchFamily="2" charset="0"/>
-              </a:rPr>
-              <a:t>.</a:t>
-            </a:r>
-            <a:br>
-              <a:rPr lang="de-DE" sz="1000" dirty="0">
-                <a:latin typeface="Courier" pitchFamily="2" charset="0"/>
-              </a:rPr>
-            </a:br>
-            <a:r>
-              <a:rPr lang="de-DE" sz="1000" dirty="0">
-                <a:latin typeface="Courier" pitchFamily="2" charset="0"/>
-              </a:rPr>
-              <a:t>2019-08-08 17:15:46.270000+02:00  Audit     TRSF_FAIL   678              Remote </a:t>
+              <a:t>zbcInstall</a:t>
+            </a:r>
+            <a:r>
+              <a:rPr lang="de-DE" sz="1000" dirty="0">
+                <a:latin typeface="Courier" pitchFamily="2" charset="0"/>
+              </a:rPr>
+              <a:t> </a:t>
             </a:r>
             <a:r>
               <a:rPr lang="de-DE" sz="1000" dirty="0" err="1">
                 <a:latin typeface="Courier" pitchFamily="2" charset="0"/>
               </a:rPr>
-              <a:t>support</a:t>
-            </a:r>
-            <a:r>
-              <a:rPr lang="de-DE" sz="1000" dirty="0">
-                <a:latin typeface="Courier" pitchFamily="2" charset="0"/>
-              </a:rPr>
-              <a:t> </a:t>
-            </a:r>
-            <a:r>
-              <a:rPr lang="de-DE" sz="1000" dirty="0" err="1">
-                <a:latin typeface="Courier" pitchFamily="2" charset="0"/>
-              </a:rPr>
-              <a:t>call</a:t>
-            </a:r>
-            <a:r>
-              <a:rPr lang="de-DE" sz="1000" dirty="0">
-                <a:latin typeface="Courier" pitchFamily="2" charset="0"/>
-              </a:rPr>
-              <a:t> </a:t>
-            </a:r>
-            <a:r>
-              <a:rPr lang="de-DE" sz="1000" dirty="0" err="1">
-                <a:latin typeface="Courier" pitchFamily="2" charset="0"/>
-              </a:rPr>
-              <a:t>generated</a:t>
-            </a:r>
-            <a:r>
-              <a:rPr lang="de-DE" sz="1000" dirty="0">
-                <a:latin typeface="Courier" pitchFamily="2" charset="0"/>
-              </a:rPr>
-              <a:t> on HMC1 </a:t>
-            </a:r>
-            <a:r>
-              <a:rPr lang="de-DE" sz="1000" dirty="0" err="1">
-                <a:latin typeface="Courier" pitchFamily="2" charset="0"/>
-              </a:rPr>
-              <a:t>fa</a:t>
-            </a:r>
-            <a:r>
-              <a:rPr lang="de-DE" sz="1000" dirty="0">
-                <a:latin typeface="Courier" pitchFamily="2" charset="0"/>
-              </a:rPr>
-              <a:t>…</a:t>
-            </a:r>
-            <a:br>
-              <a:rPr lang="de-DE" sz="1000" dirty="0">
-                <a:latin typeface="Courier" pitchFamily="2" charset="0"/>
-              </a:rPr>
-            </a:br>
-            <a:r>
-              <a:rPr lang="de-DE" sz="1000" dirty="0">
-                <a:latin typeface="Courier" pitchFamily="2" charset="0"/>
-              </a:rPr>
-              <a:t>2019-08-08 17:15:56.550000+02:00  Security  WSA </a:t>
-            </a:r>
-            <a:r>
-              <a:rPr lang="de-DE" sz="1000" dirty="0" err="1">
-                <a:latin typeface="Courier" pitchFamily="2" charset="0"/>
-              </a:rPr>
-              <a:t>Logon</a:t>
-            </a:r>
-            <a:r>
-              <a:rPr lang="de-DE" sz="1000" dirty="0">
-                <a:latin typeface="Courier" pitchFamily="2" charset="0"/>
-              </a:rPr>
-              <a:t>  1941  </a:t>
-            </a:r>
-            <a:r>
-              <a:rPr lang="de-DE" sz="1000" dirty="0" err="1">
-                <a:latin typeface="Courier" pitchFamily="2" charset="0"/>
-              </a:rPr>
-              <a:t>zbcInstall</a:t>
-            </a:r>
-            <a:r>
-              <a:rPr lang="de-DE" sz="1000" dirty="0">
-                <a:latin typeface="Courier" pitchFamily="2" charset="0"/>
-              </a:rPr>
-              <a:t>  User </a:t>
-            </a:r>
-            <a:r>
-              <a:rPr lang="de-DE" sz="1000" dirty="0" err="1">
-                <a:latin typeface="Courier" pitchFamily="2" charset="0"/>
-              </a:rPr>
-              <a:t>zbcInstall</a:t>
-            </a:r>
-            <a:r>
-              <a:rPr lang="de-DE" sz="1000" dirty="0">
-                <a:latin typeface="Courier" pitchFamily="2" charset="0"/>
-              </a:rPr>
-              <a:t> </a:t>
-            </a:r>
-            <a:r>
-              <a:rPr lang="de-DE" sz="1000" dirty="0" err="1">
-                <a:latin typeface="Courier" pitchFamily="2" charset="0"/>
-              </a:rPr>
               <a:t>has</a:t>
             </a:r>
             <a:r>
               <a:rPr lang="de-DE" sz="1000" dirty="0">
                 <a:latin typeface="Courier" pitchFamily="2" charset="0"/>
               </a:rPr>
-              <a:t> </a:t>
-            </a:r>
-            <a:r>
-              <a:rPr lang="de-DE" sz="1000" dirty="0" err="1">
-                <a:latin typeface="Courier" pitchFamily="2" charset="0"/>
-              </a:rPr>
-              <a:t>logged</a:t>
-            </a:r>
-            <a:r>
-              <a:rPr lang="de-DE" sz="1000" dirty="0">
-                <a:latin typeface="Courier" pitchFamily="2" charset="0"/>
-              </a:rPr>
-              <a:t> on </a:t>
-            </a:r>
-            <a:r>
-              <a:rPr lang="de-DE" sz="1000" dirty="0" err="1">
-                <a:latin typeface="Courier" pitchFamily="2" charset="0"/>
-              </a:rPr>
-              <a:t>to</a:t>
-            </a:r>
-            <a:r>
-              <a:rPr lang="de-DE" sz="1000" dirty="0">
-                <a:latin typeface="Courier" pitchFamily="2" charset="0"/>
-              </a:rPr>
-              <a:t> Web </a:t>
-            </a:r>
-            <a:r>
-              <a:rPr lang="de-DE" sz="1000" dirty="0" err="1">
-                <a:latin typeface="Courier" pitchFamily="2" charset="0"/>
-              </a:rPr>
-              <a:t>Ser</a:t>
-            </a:r>
-            <a:r>
-              <a:rPr lang="de-DE" sz="1000" dirty="0">
-                <a:latin typeface="Courier" pitchFamily="2" charset="0"/>
-              </a:rPr>
-              <a:t>…</a:t>
-            </a:r>
-            <a:br>
-              <a:rPr lang="de-DE" sz="1000" dirty="0">
-                <a:latin typeface="Courier" pitchFamily="2" charset="0"/>
-              </a:rPr>
-            </a:br>
-            <a:r>
-              <a:rPr lang="de-DE" sz="1000" dirty="0">
-                <a:latin typeface="Courier" pitchFamily="2" charset="0"/>
-              </a:rPr>
-              <a:t>2019-08-08 17:15:56.840000+02:00  Security  WSA </a:t>
-            </a:r>
-            <a:r>
-              <a:rPr lang="de-DE" sz="1000" dirty="0" err="1">
-                <a:latin typeface="Courier" pitchFamily="2" charset="0"/>
-              </a:rPr>
-              <a:t>Logoff</a:t>
-            </a:r>
-            <a:r>
-              <a:rPr lang="de-DE" sz="1000" dirty="0">
-                <a:latin typeface="Courier" pitchFamily="2" charset="0"/>
-              </a:rPr>
-              <a:t> 1942  </a:t>
-            </a:r>
-            <a:r>
-              <a:rPr lang="de-DE" sz="1000" dirty="0" err="1">
-                <a:latin typeface="Courier" pitchFamily="2" charset="0"/>
-              </a:rPr>
-              <a:t>zbcInstall</a:t>
-            </a:r>
-            <a:r>
-              <a:rPr lang="de-DE" sz="1000" dirty="0">
-                <a:latin typeface="Courier" pitchFamily="2" charset="0"/>
-              </a:rPr>
-              <a:t>  User </a:t>
-            </a:r>
-            <a:r>
-              <a:rPr lang="de-DE" sz="1000" dirty="0" err="1">
-                <a:latin typeface="Courier" pitchFamily="2" charset="0"/>
-              </a:rPr>
-              <a:t>zbcInstall</a:t>
-            </a:r>
-            <a:r>
-              <a:rPr lang="de-DE" sz="1000" dirty="0">
-                <a:latin typeface="Courier" pitchFamily="2" charset="0"/>
-              </a:rPr>
-              <a:t> </a:t>
-            </a:r>
-            <a:r>
-              <a:rPr lang="de-DE" sz="1000" dirty="0" err="1">
-                <a:latin typeface="Courier" pitchFamily="2" charset="0"/>
-              </a:rPr>
-              <a:t>has</a:t>
-            </a:r>
-            <a:r>
-              <a:rPr lang="de-DE" sz="1000" dirty="0">
-                <a:latin typeface="Courier" pitchFamily="2" charset="0"/>
-              </a:rPr>
-              <a:t> </a:t>
-            </a:r>
-            <a:r>
-              <a:rPr lang="de-DE" sz="1000" dirty="0" err="1">
-                <a:latin typeface="Courier" pitchFamily="2" charset="0"/>
-              </a:rPr>
-              <a:t>logged</a:t>
-            </a:r>
-            <a:r>
-              <a:rPr lang="de-DE" sz="1000" dirty="0">
-                <a:latin typeface="Courier" pitchFamily="2" charset="0"/>
-              </a:rPr>
-              <a:t> off </a:t>
-            </a:r>
-            <a:r>
-              <a:rPr lang="de-DE" sz="1000" dirty="0" err="1">
-                <a:latin typeface="Courier" pitchFamily="2" charset="0"/>
-              </a:rPr>
-              <a:t>from</a:t>
-            </a:r>
-            <a:r>
-              <a:rPr lang="de-DE" sz="1000" dirty="0">
-                <a:latin typeface="Courier" pitchFamily="2" charset="0"/>
-              </a:rPr>
-              <a:t> Web …</a:t>
+              <a:t> logge…</a:t>
             </a:r>
             <a:br>
               <a:rPr lang="de-DE" sz="1000" dirty="0">

</xml_diff>